<commit_message>
Finished `course-work` in `operation-research`
</commit_message>
<xml_diff>
--- a/3-course-6-semester/operations-research/course-work/Бронников ПМ-1901 - Курсовая работа.pptx
+++ b/3-course-6-semester/operations-research/course-work/Бронников ПМ-1901 - Курсовая работа.pptx
@@ -118,6 +118,11 @@
       </a:defRPr>
     </a:lvl9pPr>
   </p:defaultTextStyle>
+  <p:extLst>
+    <p:ext uri="{EFAFB233-063F-42B5-8137-9DF3F51BA10A}">
+      <p15:sldGuideLst xmlns:p15="http://schemas.microsoft.com/office/powerpoint/2012/main"/>
+    </p:ext>
+  </p:extLst>
 </p:presentation>
 </file>
 
@@ -3202,8 +3207,8 @@
           <a:chExt cx="0" cy="0"/>
         </a:xfrm>
       </p:grpSpPr>
-      <mc:AlternateContent xmlns:mc="http://schemas.openxmlformats.org/markup-compatibility/2006">
-        <mc:Choice xmlns:a14="http://schemas.microsoft.com/office/drawing/2010/main" Requires="a14">
+      <mc:AlternateContent xmlns:mc="http://schemas.openxmlformats.org/markup-compatibility/2006" xmlns:a14="http://schemas.microsoft.com/office/drawing/2010/main">
+        <mc:Choice Requires="a14">
           <p:sp>
             <p:nvSpPr>
               <p:cNvPr id="6" name="TextBox 5">
@@ -3243,7 +3248,9 @@
                 <a14:m>
                   <m:oMath xmlns:m="http://schemas.openxmlformats.org/officeDocument/2006/math">
                     <m:r>
-                      <a:rPr lang="en-US" sz="2200" i="1"/>
+                      <a:rPr lang="en-US" sz="2200" i="1">
+                        <a:latin typeface="Cambria Math" panose="02040503050406030204" pitchFamily="18" charset="0"/>
+                      </a:rPr>
                       <m:t>𝑛</m:t>
                     </m:r>
                   </m:oMath>
@@ -3258,7 +3265,9 @@
                 <a14:m>
                   <m:oMath xmlns:m="http://schemas.openxmlformats.org/officeDocument/2006/math">
                     <m:r>
-                      <a:rPr lang="ru-RU" sz="2200" i="1"/>
+                      <a:rPr lang="ru-RU" sz="2200" i="1">
+                        <a:latin typeface="Cambria Math" panose="02040503050406030204" pitchFamily="18" charset="0"/>
+                      </a:rPr>
                       <m:t>𝑁</m:t>
                     </m:r>
                   </m:oMath>
@@ -3278,7 +3287,7 @@
             </p:txBody>
           </p:sp>
         </mc:Choice>
-        <mc:Fallback>
+        <mc:Fallback xmlns="">
           <p:sp>
             <p:nvSpPr>
               <p:cNvPr id="6" name="TextBox 5">
@@ -3409,8 +3418,8 @@
           </a:p>
         </p:txBody>
       </p:sp>
-      <mc:AlternateContent xmlns:mc="http://schemas.openxmlformats.org/markup-compatibility/2006">
-        <mc:Choice xmlns:a14="http://schemas.microsoft.com/office/drawing/2010/main" Requires="a14">
+      <mc:AlternateContent xmlns:mc="http://schemas.openxmlformats.org/markup-compatibility/2006" xmlns:a14="http://schemas.microsoft.com/office/drawing/2010/main">
+        <mc:Choice Requires="a14">
           <p:sp>
             <p:nvSpPr>
               <p:cNvPr id="10" name="TextBox 9">
@@ -3967,7 +3976,7 @@
             </p:txBody>
           </p:sp>
         </mc:Choice>
-        <mc:Fallback>
+        <mc:Fallback xmlns="">
           <p:sp>
             <p:nvSpPr>
               <p:cNvPr id="10" name="TextBox 9">
@@ -4176,8 +4185,8 @@
           </a:p>
         </p:txBody>
       </p:sp>
-      <mc:AlternateContent xmlns:mc="http://schemas.openxmlformats.org/markup-compatibility/2006">
-        <mc:Choice xmlns:a14="http://schemas.microsoft.com/office/drawing/2010/main" Requires="a14">
+      <mc:AlternateContent xmlns:mc="http://schemas.openxmlformats.org/markup-compatibility/2006" xmlns:a14="http://schemas.microsoft.com/office/drawing/2010/main">
+        <mc:Choice Requires="a14">
           <p:sp>
             <p:nvSpPr>
               <p:cNvPr id="6" name="TextBox 5">
@@ -4217,7 +4226,9 @@
                 <a14:m>
                   <m:oMath xmlns:m="http://schemas.openxmlformats.org/officeDocument/2006/math">
                     <m:r>
-                      <a:rPr lang="ru-RU" sz="2200" i="1"/>
+                      <a:rPr lang="ru-RU" sz="2200" i="1">
+                        <a:latin typeface="Cambria Math" panose="02040503050406030204" pitchFamily="18" charset="0"/>
+                      </a:rPr>
                       <m:t>𝑁</m:t>
                     </m:r>
                   </m:oMath>
@@ -4232,7 +4243,9 @@
                 <a14:m>
                   <m:oMath xmlns:m="http://schemas.openxmlformats.org/officeDocument/2006/math">
                     <m:r>
-                      <a:rPr lang="ru-RU" sz="2200" i="1"/>
+                      <a:rPr lang="ru-RU" sz="2200" i="1">
+                        <a:latin typeface="Cambria Math" panose="02040503050406030204" pitchFamily="18" charset="0"/>
+                      </a:rPr>
                       <m:t>𝑊</m:t>
                     </m:r>
                   </m:oMath>
@@ -4247,80 +4260,108 @@
                 <a14:m>
                   <m:oMath xmlns:m="http://schemas.openxmlformats.org/officeDocument/2006/math">
                     <m:r>
-                      <a:rPr lang="ru-RU" sz="2200" i="1"/>
+                      <a:rPr lang="ru-RU" sz="2200" i="1">
+                        <a:latin typeface="Cambria Math" panose="02040503050406030204" pitchFamily="18" charset="0"/>
+                      </a:rPr>
                       <m:t>𝑤</m:t>
                     </m:r>
                     <m:r>
-                      <a:rPr lang="ru-RU" sz="2200" i="1"/>
+                      <a:rPr lang="ru-RU" sz="2200" i="1">
+                        <a:latin typeface="Cambria Math" panose="02040503050406030204" pitchFamily="18" charset="0"/>
+                      </a:rPr>
                       <m:t>=(</m:t>
                     </m:r>
                     <m:sSub>
                       <m:sSubPr>
                         <m:ctrlPr>
-                          <a:rPr lang="en-US" sz="2200" i="1"/>
+                          <a:rPr lang="en-US" sz="2200" i="1">
+                            <a:latin typeface="Cambria Math" panose="02040503050406030204" pitchFamily="18" charset="0"/>
+                          </a:rPr>
                         </m:ctrlPr>
                       </m:sSubPr>
                       <m:e>
                         <m:r>
-                          <a:rPr lang="ru-RU" sz="2200" i="1"/>
+                          <a:rPr lang="ru-RU" sz="2200" i="1">
+                            <a:latin typeface="Cambria Math" panose="02040503050406030204" pitchFamily="18" charset="0"/>
+                          </a:rPr>
                           <m:t>𝑤</m:t>
                         </m:r>
                       </m:e>
                       <m:sub>
                         <m:r>
-                          <a:rPr lang="ru-RU" sz="2200" i="1"/>
+                          <a:rPr lang="ru-RU" sz="2200" i="1">
+                            <a:latin typeface="Cambria Math" panose="02040503050406030204" pitchFamily="18" charset="0"/>
+                          </a:rPr>
                           <m:t>1</m:t>
                         </m:r>
                       </m:sub>
                     </m:sSub>
                     <m:r>
-                      <a:rPr lang="ru-RU" sz="2200" i="1"/>
+                      <a:rPr lang="ru-RU" sz="2200" i="1">
+                        <a:latin typeface="Cambria Math" panose="02040503050406030204" pitchFamily="18" charset="0"/>
+                      </a:rPr>
                       <m:t>,</m:t>
                     </m:r>
                     <m:sSub>
                       <m:sSubPr>
                         <m:ctrlPr>
-                          <a:rPr lang="en-US" sz="2200" i="1"/>
+                          <a:rPr lang="en-US" sz="2200" i="1">
+                            <a:latin typeface="Cambria Math" panose="02040503050406030204" pitchFamily="18" charset="0"/>
+                          </a:rPr>
                         </m:ctrlPr>
                       </m:sSubPr>
                       <m:e>
                         <m:r>
-                          <a:rPr lang="ru-RU" sz="2200" i="1"/>
+                          <a:rPr lang="ru-RU" sz="2200" i="1">
+                            <a:latin typeface="Cambria Math" panose="02040503050406030204" pitchFamily="18" charset="0"/>
+                          </a:rPr>
                           <m:t>𝑤</m:t>
                         </m:r>
                       </m:e>
                       <m:sub>
                         <m:r>
-                          <a:rPr lang="ru-RU" sz="2200" i="1"/>
+                          <a:rPr lang="ru-RU" sz="2200" i="1">
+                            <a:latin typeface="Cambria Math" panose="02040503050406030204" pitchFamily="18" charset="0"/>
+                          </a:rPr>
                           <m:t>2</m:t>
                         </m:r>
                       </m:sub>
                     </m:sSub>
                     <m:r>
-                      <a:rPr lang="ru-RU" sz="2200" i="1"/>
+                      <a:rPr lang="ru-RU" sz="2200" i="1">
+                        <a:latin typeface="Cambria Math" panose="02040503050406030204" pitchFamily="18" charset="0"/>
+                      </a:rPr>
                       <m:t>,…,</m:t>
                     </m:r>
                     <m:sSub>
                       <m:sSubPr>
                         <m:ctrlPr>
-                          <a:rPr lang="en-US" sz="2200" i="1"/>
+                          <a:rPr lang="en-US" sz="2200" i="1">
+                            <a:latin typeface="Cambria Math" panose="02040503050406030204" pitchFamily="18" charset="0"/>
+                          </a:rPr>
                         </m:ctrlPr>
                       </m:sSubPr>
                       <m:e>
                         <m:r>
-                          <a:rPr lang="ru-RU" sz="2200" i="1"/>
+                          <a:rPr lang="ru-RU" sz="2200" i="1">
+                            <a:latin typeface="Cambria Math" panose="02040503050406030204" pitchFamily="18" charset="0"/>
+                          </a:rPr>
                           <m:t>𝑤</m:t>
                         </m:r>
                       </m:e>
                       <m:sub>
                         <m:r>
-                          <a:rPr lang="ru-RU" sz="2200" i="1"/>
+                          <a:rPr lang="ru-RU" sz="2200" i="1">
+                            <a:latin typeface="Cambria Math" panose="02040503050406030204" pitchFamily="18" charset="0"/>
+                          </a:rPr>
                           <m:t>𝑁</m:t>
                         </m:r>
                       </m:sub>
                     </m:sSub>
                     <m:r>
-                      <a:rPr lang="ru-RU" sz="2200" i="1"/>
+                      <a:rPr lang="ru-RU" sz="2200" i="1">
+                        <a:latin typeface="Cambria Math" panose="02040503050406030204" pitchFamily="18" charset="0"/>
+                      </a:rPr>
                       <m:t>)</m:t>
                     </m:r>
                   </m:oMath>
@@ -4335,80 +4376,108 @@
                 <a14:m>
                   <m:oMath xmlns:m="http://schemas.openxmlformats.org/officeDocument/2006/math">
                     <m:r>
-                      <a:rPr lang="ru-RU" sz="2200" i="1"/>
+                      <a:rPr lang="ru-RU" sz="2200" i="1">
+                        <a:latin typeface="Cambria Math" panose="02040503050406030204" pitchFamily="18" charset="0"/>
+                      </a:rPr>
                       <m:t>𝑝</m:t>
                     </m:r>
                     <m:r>
-                      <a:rPr lang="ru-RU" sz="2200" i="1"/>
+                      <a:rPr lang="ru-RU" sz="2200" i="1">
+                        <a:latin typeface="Cambria Math" panose="02040503050406030204" pitchFamily="18" charset="0"/>
+                      </a:rPr>
                       <m:t>=(</m:t>
                     </m:r>
                     <m:sSub>
                       <m:sSubPr>
                         <m:ctrlPr>
-                          <a:rPr lang="en-US" sz="2200" i="1"/>
+                          <a:rPr lang="en-US" sz="2200" i="1">
+                            <a:latin typeface="Cambria Math" panose="02040503050406030204" pitchFamily="18" charset="0"/>
+                          </a:rPr>
                         </m:ctrlPr>
                       </m:sSubPr>
                       <m:e>
                         <m:r>
-                          <a:rPr lang="ru-RU" sz="2200" i="1"/>
+                          <a:rPr lang="ru-RU" sz="2200" i="1">
+                            <a:latin typeface="Cambria Math" panose="02040503050406030204" pitchFamily="18" charset="0"/>
+                          </a:rPr>
                           <m:t>𝑝</m:t>
                         </m:r>
                       </m:e>
                       <m:sub>
                         <m:r>
-                          <a:rPr lang="ru-RU" sz="2200" i="1"/>
+                          <a:rPr lang="ru-RU" sz="2200" i="1">
+                            <a:latin typeface="Cambria Math" panose="02040503050406030204" pitchFamily="18" charset="0"/>
+                          </a:rPr>
                           <m:t>1</m:t>
                         </m:r>
                       </m:sub>
                     </m:sSub>
                     <m:r>
-                      <a:rPr lang="ru-RU" sz="2200" i="1"/>
+                      <a:rPr lang="ru-RU" sz="2200" i="1">
+                        <a:latin typeface="Cambria Math" panose="02040503050406030204" pitchFamily="18" charset="0"/>
+                      </a:rPr>
                       <m:t>,</m:t>
                     </m:r>
                     <m:sSub>
                       <m:sSubPr>
                         <m:ctrlPr>
-                          <a:rPr lang="en-US" sz="2200" i="1"/>
+                          <a:rPr lang="en-US" sz="2200" i="1">
+                            <a:latin typeface="Cambria Math" panose="02040503050406030204" pitchFamily="18" charset="0"/>
+                          </a:rPr>
                         </m:ctrlPr>
                       </m:sSubPr>
                       <m:e>
                         <m:r>
-                          <a:rPr lang="ru-RU" sz="2200" i="1"/>
+                          <a:rPr lang="ru-RU" sz="2200" i="1">
+                            <a:latin typeface="Cambria Math" panose="02040503050406030204" pitchFamily="18" charset="0"/>
+                          </a:rPr>
                           <m:t>𝑝</m:t>
                         </m:r>
                       </m:e>
                       <m:sub>
                         <m:r>
-                          <a:rPr lang="ru-RU" sz="2200" i="1"/>
+                          <a:rPr lang="ru-RU" sz="2200" i="1">
+                            <a:latin typeface="Cambria Math" panose="02040503050406030204" pitchFamily="18" charset="0"/>
+                          </a:rPr>
                           <m:t>2</m:t>
                         </m:r>
                       </m:sub>
                     </m:sSub>
                     <m:r>
-                      <a:rPr lang="ru-RU" sz="2200" i="1"/>
+                      <a:rPr lang="ru-RU" sz="2200" i="1">
+                        <a:latin typeface="Cambria Math" panose="02040503050406030204" pitchFamily="18" charset="0"/>
+                      </a:rPr>
                       <m:t>,…,</m:t>
                     </m:r>
                     <m:sSub>
                       <m:sSubPr>
                         <m:ctrlPr>
-                          <a:rPr lang="en-US" sz="2200" i="1"/>
+                          <a:rPr lang="en-US" sz="2200" i="1">
+                            <a:latin typeface="Cambria Math" panose="02040503050406030204" pitchFamily="18" charset="0"/>
+                          </a:rPr>
                         </m:ctrlPr>
                       </m:sSubPr>
                       <m:e>
                         <m:r>
-                          <a:rPr lang="ru-RU" sz="2200" i="1"/>
+                          <a:rPr lang="ru-RU" sz="2200" i="1">
+                            <a:latin typeface="Cambria Math" panose="02040503050406030204" pitchFamily="18" charset="0"/>
+                          </a:rPr>
                           <m:t>𝑝</m:t>
                         </m:r>
                       </m:e>
                       <m:sub>
                         <m:r>
-                          <a:rPr lang="ru-RU" sz="2200" i="1"/>
+                          <a:rPr lang="ru-RU" sz="2200" i="1">
+                            <a:latin typeface="Cambria Math" panose="02040503050406030204" pitchFamily="18" charset="0"/>
+                          </a:rPr>
                           <m:t>𝑁</m:t>
                         </m:r>
                       </m:sub>
                     </m:sSub>
                     <m:r>
-                      <a:rPr lang="ru-RU" sz="2200" i="1"/>
+                      <a:rPr lang="ru-RU" sz="2200" i="1">
+                        <a:latin typeface="Cambria Math" panose="02040503050406030204" pitchFamily="18" charset="0"/>
+                      </a:rPr>
                       <m:t>)</m:t>
                     </m:r>
                   </m:oMath>
@@ -4423,80 +4492,108 @@
                 <a14:m>
                   <m:oMath xmlns:m="http://schemas.openxmlformats.org/officeDocument/2006/math">
                     <m:r>
-                      <a:rPr lang="ru-RU" sz="2200" i="1"/>
+                      <a:rPr lang="ru-RU" sz="2200" i="1">
+                        <a:latin typeface="Cambria Math" panose="02040503050406030204" pitchFamily="18" charset="0"/>
+                      </a:rPr>
                       <m:t>𝐵</m:t>
                     </m:r>
                     <m:r>
-                      <a:rPr lang="ru-RU" sz="2200" i="1"/>
+                      <a:rPr lang="ru-RU" sz="2200" i="1">
+                        <a:latin typeface="Cambria Math" panose="02040503050406030204" pitchFamily="18" charset="0"/>
+                      </a:rPr>
                       <m:t>=(</m:t>
                     </m:r>
                     <m:sSub>
                       <m:sSubPr>
                         <m:ctrlPr>
-                          <a:rPr lang="en-US" sz="2200" i="1"/>
+                          <a:rPr lang="en-US" sz="2200" i="1">
+                            <a:latin typeface="Cambria Math" panose="02040503050406030204" pitchFamily="18" charset="0"/>
+                          </a:rPr>
                         </m:ctrlPr>
                       </m:sSubPr>
                       <m:e>
                         <m:r>
-                          <a:rPr lang="ru-RU" sz="2200" i="1"/>
+                          <a:rPr lang="ru-RU" sz="2200" i="1">
+                            <a:latin typeface="Cambria Math" panose="02040503050406030204" pitchFamily="18" charset="0"/>
+                          </a:rPr>
                           <m:t>𝑏</m:t>
                         </m:r>
                       </m:e>
                       <m:sub>
                         <m:r>
-                          <a:rPr lang="ru-RU" sz="2200" i="1"/>
+                          <a:rPr lang="ru-RU" sz="2200" i="1">
+                            <a:latin typeface="Cambria Math" panose="02040503050406030204" pitchFamily="18" charset="0"/>
+                          </a:rPr>
                           <m:t>1</m:t>
                         </m:r>
                       </m:sub>
                     </m:sSub>
                     <m:r>
-                      <a:rPr lang="ru-RU" sz="2200" i="1"/>
+                      <a:rPr lang="ru-RU" sz="2200" i="1">
+                        <a:latin typeface="Cambria Math" panose="02040503050406030204" pitchFamily="18" charset="0"/>
+                      </a:rPr>
                       <m:t>,</m:t>
                     </m:r>
                     <m:sSub>
                       <m:sSubPr>
                         <m:ctrlPr>
-                          <a:rPr lang="en-US" sz="2200" i="1"/>
+                          <a:rPr lang="en-US" sz="2200" i="1">
+                            <a:latin typeface="Cambria Math" panose="02040503050406030204" pitchFamily="18" charset="0"/>
+                          </a:rPr>
                         </m:ctrlPr>
                       </m:sSubPr>
                       <m:e>
                         <m:r>
-                          <a:rPr lang="ru-RU" sz="2200" i="1"/>
+                          <a:rPr lang="ru-RU" sz="2200" i="1">
+                            <a:latin typeface="Cambria Math" panose="02040503050406030204" pitchFamily="18" charset="0"/>
+                          </a:rPr>
                           <m:t>𝑏</m:t>
                         </m:r>
                       </m:e>
                       <m:sub>
                         <m:r>
-                          <a:rPr lang="ru-RU" sz="2200" i="1"/>
+                          <a:rPr lang="ru-RU" sz="2200" i="1">
+                            <a:latin typeface="Cambria Math" panose="02040503050406030204" pitchFamily="18" charset="0"/>
+                          </a:rPr>
                           <m:t>2</m:t>
                         </m:r>
                       </m:sub>
                     </m:sSub>
                     <m:r>
-                      <a:rPr lang="ru-RU" sz="2200" i="1"/>
+                      <a:rPr lang="ru-RU" sz="2200" i="1">
+                        <a:latin typeface="Cambria Math" panose="02040503050406030204" pitchFamily="18" charset="0"/>
+                      </a:rPr>
                       <m:t>,…</m:t>
                     </m:r>
                     <m:sSub>
                       <m:sSubPr>
                         <m:ctrlPr>
-                          <a:rPr lang="en-US" sz="2200" i="1"/>
+                          <a:rPr lang="en-US" sz="2200" i="1">
+                            <a:latin typeface="Cambria Math" panose="02040503050406030204" pitchFamily="18" charset="0"/>
+                          </a:rPr>
                         </m:ctrlPr>
                       </m:sSubPr>
                       <m:e>
                         <m:r>
-                          <a:rPr lang="ru-RU" sz="2200" i="1"/>
+                          <a:rPr lang="ru-RU" sz="2200" i="1">
+                            <a:latin typeface="Cambria Math" panose="02040503050406030204" pitchFamily="18" charset="0"/>
+                          </a:rPr>
                           <m:t>𝑏</m:t>
                         </m:r>
                       </m:e>
                       <m:sub>
                         <m:r>
-                          <a:rPr lang="ru-RU" sz="2200" i="1"/>
+                          <a:rPr lang="ru-RU" sz="2200" i="1">
+                            <a:latin typeface="Cambria Math" panose="02040503050406030204" pitchFamily="18" charset="0"/>
+                          </a:rPr>
                           <m:t>𝑁</m:t>
                         </m:r>
                       </m:sub>
                     </m:sSub>
                     <m:r>
-                      <a:rPr lang="ru-RU" sz="2200" i="1"/>
+                      <a:rPr lang="ru-RU" sz="2200" i="1">
+                        <a:latin typeface="Cambria Math" panose="02040503050406030204" pitchFamily="18" charset="0"/>
+                      </a:rPr>
                       <m:t>)</m:t>
                     </m:r>
                   </m:oMath>
@@ -4513,24 +4610,32 @@
                     <m:sSub>
                       <m:sSubPr>
                         <m:ctrlPr>
-                          <a:rPr lang="en-US" sz="2200" i="1"/>
+                          <a:rPr lang="en-US" sz="2200" i="1">
+                            <a:latin typeface="Cambria Math" panose="02040503050406030204" pitchFamily="18" charset="0"/>
+                          </a:rPr>
                         </m:ctrlPr>
                       </m:sSubPr>
                       <m:e>
                         <m:r>
-                          <a:rPr lang="ru-RU" sz="2200" i="1"/>
+                          <a:rPr lang="ru-RU" sz="2200" i="1">
+                            <a:latin typeface="Cambria Math" panose="02040503050406030204" pitchFamily="18" charset="0"/>
+                          </a:rPr>
                           <m:t>𝑏</m:t>
                         </m:r>
                       </m:e>
                       <m:sub>
                         <m:r>
-                          <a:rPr lang="ru-RU" sz="2200" i="1"/>
+                          <a:rPr lang="ru-RU" sz="2200" i="1">
+                            <a:latin typeface="Cambria Math" panose="02040503050406030204" pitchFamily="18" charset="0"/>
+                          </a:rPr>
                           <m:t>𝑖</m:t>
                         </m:r>
                       </m:sub>
                     </m:sSub>
                     <m:r>
-                      <a:rPr lang="ru-RU" sz="2200" i="1"/>
+                      <a:rPr lang="ru-RU" sz="2200" i="1">
+                        <a:latin typeface="Cambria Math" panose="02040503050406030204" pitchFamily="18" charset="0"/>
+                      </a:rPr>
                       <m:t>=1</m:t>
                     </m:r>
                   </m:oMath>
@@ -4545,7 +4650,9 @@
                 <a14:m>
                   <m:oMath xmlns:m="http://schemas.openxmlformats.org/officeDocument/2006/math">
                     <m:r>
-                      <a:rPr lang="en-US" sz="2200" i="1"/>
+                      <a:rPr lang="en-US" sz="2200" i="1">
+                        <a:latin typeface="Cambria Math" panose="02040503050406030204" pitchFamily="18" charset="0"/>
+                      </a:rPr>
                       <m:t>𝑖</m:t>
                     </m:r>
                   </m:oMath>
@@ -4569,24 +4676,32 @@
                     <m:sSub>
                       <m:sSubPr>
                         <m:ctrlPr>
-                          <a:rPr lang="en-US" sz="2200" i="1"/>
+                          <a:rPr lang="en-US" sz="2200" i="1">
+                            <a:latin typeface="Cambria Math" panose="02040503050406030204" pitchFamily="18" charset="0"/>
+                          </a:rPr>
                         </m:ctrlPr>
                       </m:sSubPr>
                       <m:e>
                         <m:r>
-                          <a:rPr lang="ru-RU" sz="2200" i="1"/>
+                          <a:rPr lang="ru-RU" sz="2200" i="1">
+                            <a:latin typeface="Cambria Math" panose="02040503050406030204" pitchFamily="18" charset="0"/>
+                          </a:rPr>
                           <m:t>𝑏</m:t>
                         </m:r>
                       </m:e>
                       <m:sub>
                         <m:r>
-                          <a:rPr lang="ru-RU" sz="2200" i="1"/>
+                          <a:rPr lang="ru-RU" sz="2200" i="1">
+                            <a:latin typeface="Cambria Math" panose="02040503050406030204" pitchFamily="18" charset="0"/>
+                          </a:rPr>
                           <m:t>𝑖</m:t>
                         </m:r>
                       </m:sub>
                     </m:sSub>
                     <m:r>
-                      <a:rPr lang="ru-RU" sz="2200" i="1"/>
+                      <a:rPr lang="ru-RU" sz="2200" i="1">
+                        <a:latin typeface="Cambria Math" panose="02040503050406030204" pitchFamily="18" charset="0"/>
+                      </a:rPr>
                       <m:t>=0</m:t>
                     </m:r>
                   </m:oMath>
@@ -4601,7 +4716,9 @@
                 <a14:m>
                   <m:oMath xmlns:m="http://schemas.openxmlformats.org/officeDocument/2006/math">
                     <m:r>
-                      <a:rPr lang="ru-RU" sz="2200" i="1"/>
+                      <a:rPr lang="ru-RU" sz="2200" i="1">
+                        <a:latin typeface="Cambria Math" panose="02040503050406030204" pitchFamily="18" charset="0"/>
+                      </a:rPr>
                       <m:t>𝑖</m:t>
                     </m:r>
                   </m:oMath>
@@ -4621,7 +4738,7 @@
             </p:txBody>
           </p:sp>
         </mc:Choice>
-        <mc:Fallback>
+        <mc:Fallback xmlns="">
           <p:sp>
             <p:nvSpPr>
               <p:cNvPr id="6" name="TextBox 5">
@@ -4708,8 +4825,8 @@
           </a:p>
         </p:txBody>
       </p:sp>
-      <mc:AlternateContent xmlns:mc="http://schemas.openxmlformats.org/markup-compatibility/2006">
-        <mc:Choice xmlns:a14="http://schemas.microsoft.com/office/drawing/2010/main" Requires="a14">
+      <mc:AlternateContent xmlns:mc="http://schemas.openxmlformats.org/markup-compatibility/2006" xmlns:a14="http://schemas.microsoft.com/office/drawing/2010/main">
+        <mc:Choice Requires="a14">
           <p:sp>
             <p:nvSpPr>
               <p:cNvPr id="8" name="TextBox 7">
@@ -4856,7 +4973,7 @@
             </p:txBody>
           </p:sp>
         </mc:Choice>
-        <mc:Fallback>
+        <mc:Fallback xmlns="">
           <p:sp>
             <p:nvSpPr>
               <p:cNvPr id="8" name="TextBox 7">
@@ -4901,8 +5018,8 @@
           </p:sp>
         </mc:Fallback>
       </mc:AlternateContent>
-      <mc:AlternateContent xmlns:mc="http://schemas.openxmlformats.org/markup-compatibility/2006">
-        <mc:Choice xmlns:a14="http://schemas.microsoft.com/office/drawing/2010/main" Requires="a14">
+      <mc:AlternateContent xmlns:mc="http://schemas.openxmlformats.org/markup-compatibility/2006" xmlns:a14="http://schemas.microsoft.com/office/drawing/2010/main">
+        <mc:Choice Requires="a14">
           <p:sp>
             <p:nvSpPr>
               <p:cNvPr id="9" name="TextBox 8">
@@ -5197,7 +5314,7 @@
             </p:txBody>
           </p:sp>
         </mc:Choice>
-        <mc:Fallback>
+        <mc:Fallback xmlns="">
           <p:sp>
             <p:nvSpPr>
               <p:cNvPr id="9" name="TextBox 8">
@@ -5361,8 +5478,8 @@
           </a:p>
         </p:txBody>
       </p:sp>
-      <mc:AlternateContent xmlns:mc="http://schemas.openxmlformats.org/markup-compatibility/2006">
-        <mc:Choice xmlns:a14="http://schemas.microsoft.com/office/drawing/2010/main" Requires="a14">
+      <mc:AlternateContent xmlns:mc="http://schemas.openxmlformats.org/markup-compatibility/2006" xmlns:a14="http://schemas.microsoft.com/office/drawing/2010/main">
+        <mc:Choice Requires="a14">
           <p:sp>
             <p:nvSpPr>
               <p:cNvPr id="6" name="TextBox 5">
@@ -5402,27 +5519,39 @@
                 <a14:m>
                   <m:oMath xmlns:m="http://schemas.openxmlformats.org/officeDocument/2006/math">
                     <m:r>
-                      <a:rPr lang="ru-RU" sz="2200" i="1"/>
+                      <a:rPr lang="ru-RU" sz="2200" i="1">
+                        <a:latin typeface="Cambria Math" panose="02040503050406030204" pitchFamily="18" charset="0"/>
+                      </a:rPr>
                       <m:t>𝐹</m:t>
                     </m:r>
                     <m:r>
-                      <a:rPr lang="ru-RU" sz="2200" i="1"/>
+                      <a:rPr lang="ru-RU" sz="2200" i="1">
+                        <a:latin typeface="Cambria Math" panose="02040503050406030204" pitchFamily="18" charset="0"/>
+                      </a:rPr>
                       <m:t>(</m:t>
                     </m:r>
                     <m:r>
-                      <a:rPr lang="ru-RU" sz="2200" i="1"/>
+                      <a:rPr lang="ru-RU" sz="2200" i="1">
+                        <a:latin typeface="Cambria Math" panose="02040503050406030204" pitchFamily="18" charset="0"/>
+                      </a:rPr>
                       <m:t>𝑘</m:t>
                     </m:r>
                     <m:r>
-                      <a:rPr lang="ru-RU" sz="2200" i="1"/>
+                      <a:rPr lang="ru-RU" sz="2200" i="1">
+                        <a:latin typeface="Cambria Math" panose="02040503050406030204" pitchFamily="18" charset="0"/>
+                      </a:rPr>
                       <m:t>,</m:t>
                     </m:r>
                     <m:r>
-                      <a:rPr lang="ru-RU" sz="2200" i="1"/>
+                      <a:rPr lang="ru-RU" sz="2200" i="1">
+                        <a:latin typeface="Cambria Math" panose="02040503050406030204" pitchFamily="18" charset="0"/>
+                      </a:rPr>
                       <m:t>𝑠</m:t>
                     </m:r>
                     <m:r>
-                      <a:rPr lang="ru-RU" sz="2200" i="1"/>
+                      <a:rPr lang="ru-RU" sz="2200" i="1">
+                        <a:latin typeface="Cambria Math" panose="02040503050406030204" pitchFamily="18" charset="0"/>
+                      </a:rPr>
                       <m:t>)</m:t>
                     </m:r>
                   </m:oMath>
@@ -5437,7 +5566,9 @@
                 <a14:m>
                   <m:oMath xmlns:m="http://schemas.openxmlformats.org/officeDocument/2006/math">
                     <m:r>
-                      <a:rPr lang="en-US" sz="2200" i="1"/>
+                      <a:rPr lang="en-US" sz="2200" i="1">
+                        <a:latin typeface="Cambria Math" panose="02040503050406030204" pitchFamily="18" charset="0"/>
+                      </a:rPr>
                       <m:t>𝑠</m:t>
                     </m:r>
                   </m:oMath>
@@ -5452,7 +5583,9 @@
                 <a14:m>
                   <m:oMath xmlns:m="http://schemas.openxmlformats.org/officeDocument/2006/math">
                     <m:r>
-                      <a:rPr lang="en-US" sz="2200" i="1"/>
+                      <a:rPr lang="en-US" sz="2200" i="1">
+                        <a:latin typeface="Cambria Math" panose="02040503050406030204" pitchFamily="18" charset="0"/>
+                      </a:rPr>
                       <m:t>𝑘</m:t>
                     </m:r>
                   </m:oMath>
@@ -5467,76 +5600,102 @@
                 <a14:m>
                   <m:oMath xmlns:m="http://schemas.openxmlformats.org/officeDocument/2006/math">
                     <m:r>
-                      <a:rPr lang="ru-RU" sz="2200" i="1"/>
+                      <a:rPr lang="ru-RU" sz="2200" i="1">
+                        <a:latin typeface="Cambria Math" panose="02040503050406030204" pitchFamily="18" charset="0"/>
+                      </a:rPr>
                       <m:t>(</m:t>
                     </m:r>
                     <m:sSub>
                       <m:sSubPr>
                         <m:ctrlPr>
-                          <a:rPr lang="en-US" sz="2200" i="1"/>
+                          <a:rPr lang="en-US" sz="2200" i="1">
+                            <a:latin typeface="Cambria Math" panose="02040503050406030204" pitchFamily="18" charset="0"/>
+                          </a:rPr>
                         </m:ctrlPr>
                       </m:sSubPr>
                       <m:e>
                         <m:r>
-                          <a:rPr lang="ru-RU" sz="2200" i="1"/>
+                          <a:rPr lang="ru-RU" sz="2200" i="1">
+                            <a:latin typeface="Cambria Math" panose="02040503050406030204" pitchFamily="18" charset="0"/>
+                          </a:rPr>
                           <m:t>𝑛</m:t>
                         </m:r>
                       </m:e>
                       <m:sub>
                         <m:r>
-                          <a:rPr lang="ru-RU" sz="2200" i="1"/>
+                          <a:rPr lang="ru-RU" sz="2200" i="1">
+                            <a:latin typeface="Cambria Math" panose="02040503050406030204" pitchFamily="18" charset="0"/>
+                          </a:rPr>
                           <m:t>1</m:t>
                         </m:r>
                       </m:sub>
                     </m:sSub>
                     <m:r>
-                      <a:rPr lang="ru-RU" sz="2200" i="1"/>
+                      <a:rPr lang="ru-RU" sz="2200" i="1">
+                        <a:latin typeface="Cambria Math" panose="02040503050406030204" pitchFamily="18" charset="0"/>
+                      </a:rPr>
                       <m:t>,</m:t>
                     </m:r>
                     <m:sSub>
                       <m:sSubPr>
                         <m:ctrlPr>
-                          <a:rPr lang="en-US" sz="2200" i="1"/>
+                          <a:rPr lang="en-US" sz="2200" i="1">
+                            <a:latin typeface="Cambria Math" panose="02040503050406030204" pitchFamily="18" charset="0"/>
+                          </a:rPr>
                         </m:ctrlPr>
                       </m:sSubPr>
                       <m:e>
                         <m:r>
-                          <a:rPr lang="ru-RU" sz="2200" i="1"/>
+                          <a:rPr lang="ru-RU" sz="2200" i="1">
+                            <a:latin typeface="Cambria Math" panose="02040503050406030204" pitchFamily="18" charset="0"/>
+                          </a:rPr>
                           <m:t>𝑛</m:t>
                         </m:r>
                       </m:e>
                       <m:sub>
                         <m:r>
-                          <a:rPr lang="ru-RU" sz="2200" i="1"/>
+                          <a:rPr lang="ru-RU" sz="2200" i="1">
+                            <a:latin typeface="Cambria Math" panose="02040503050406030204" pitchFamily="18" charset="0"/>
+                          </a:rPr>
                           <m:t>2</m:t>
                         </m:r>
                       </m:sub>
                     </m:sSub>
                     <m:r>
-                      <a:rPr lang="ru-RU" sz="2200" i="1"/>
+                      <a:rPr lang="ru-RU" sz="2200" i="1">
+                        <a:latin typeface="Cambria Math" panose="02040503050406030204" pitchFamily="18" charset="0"/>
+                      </a:rPr>
                       <m:t>,…,</m:t>
                     </m:r>
                     <m:sSub>
                       <m:sSubPr>
                         <m:ctrlPr>
-                          <a:rPr lang="en-US" sz="2200" i="1"/>
+                          <a:rPr lang="en-US" sz="2200" i="1">
+                            <a:latin typeface="Cambria Math" panose="02040503050406030204" pitchFamily="18" charset="0"/>
+                          </a:rPr>
                         </m:ctrlPr>
                       </m:sSubPr>
                       <m:e>
                         <m:r>
-                          <a:rPr lang="ru-RU" sz="2200" i="1"/>
+                          <a:rPr lang="ru-RU" sz="2200" i="1">
+                            <a:latin typeface="Cambria Math" panose="02040503050406030204" pitchFamily="18" charset="0"/>
+                          </a:rPr>
                           <m:t>𝑛</m:t>
                         </m:r>
                       </m:e>
                       <m:sub>
                         <m:r>
-                          <a:rPr lang="ru-RU" sz="2200" i="1"/>
+                          <a:rPr lang="ru-RU" sz="2200" i="1">
+                            <a:latin typeface="Cambria Math" panose="02040503050406030204" pitchFamily="18" charset="0"/>
+                          </a:rPr>
                           <m:t>𝑘</m:t>
                         </m:r>
                       </m:sub>
                     </m:sSub>
                     <m:r>
-                      <a:rPr lang="ru-RU" sz="2200" i="1"/>
+                      <a:rPr lang="ru-RU" sz="2200" i="1">
+                        <a:latin typeface="Cambria Math" panose="02040503050406030204" pitchFamily="18" charset="0"/>
+                      </a:rPr>
                       <m:t>)</m:t>
                     </m:r>
                   </m:oMath>
@@ -5551,27 +5710,39 @@
                 <a14:m>
                   <m:oMath xmlns:m="http://schemas.openxmlformats.org/officeDocument/2006/math">
                     <m:r>
-                      <a:rPr lang="ru-RU" sz="2200" i="1"/>
+                      <a:rPr lang="ru-RU" sz="2200" i="1">
+                        <a:latin typeface="Cambria Math" panose="02040503050406030204" pitchFamily="18" charset="0"/>
+                      </a:rPr>
                       <m:t>𝐹</m:t>
                     </m:r>
                     <m:r>
-                      <a:rPr lang="ru-RU" sz="2200" i="1"/>
+                      <a:rPr lang="ru-RU" sz="2200" i="1">
+                        <a:latin typeface="Cambria Math" panose="02040503050406030204" pitchFamily="18" charset="0"/>
+                      </a:rPr>
                       <m:t>(</m:t>
                     </m:r>
                     <m:r>
-                      <a:rPr lang="ru-RU" sz="2200" i="1"/>
+                      <a:rPr lang="ru-RU" sz="2200" i="1">
+                        <a:latin typeface="Cambria Math" panose="02040503050406030204" pitchFamily="18" charset="0"/>
+                      </a:rPr>
                       <m:t>𝑘</m:t>
                     </m:r>
                     <m:r>
-                      <a:rPr lang="ru-RU" sz="2200" i="1"/>
+                      <a:rPr lang="ru-RU" sz="2200" i="1">
+                        <a:latin typeface="Cambria Math" panose="02040503050406030204" pitchFamily="18" charset="0"/>
+                      </a:rPr>
                       <m:t>,</m:t>
                     </m:r>
                     <m:r>
-                      <a:rPr lang="ru-RU" sz="2200" i="1"/>
+                      <a:rPr lang="ru-RU" sz="2200" i="1">
+                        <a:latin typeface="Cambria Math" panose="02040503050406030204" pitchFamily="18" charset="0"/>
+                      </a:rPr>
                       <m:t>𝑠</m:t>
                     </m:r>
                     <m:r>
-                      <a:rPr lang="ru-RU" sz="2200" i="1"/>
+                      <a:rPr lang="ru-RU" sz="2200" i="1">
+                        <a:latin typeface="Cambria Math" panose="02040503050406030204" pitchFamily="18" charset="0"/>
+                      </a:rPr>
                       <m:t>)</m:t>
                     </m:r>
                   </m:oMath>
@@ -5586,28 +5757,38 @@
                 <a14:m>
                   <m:oMath xmlns:m="http://schemas.openxmlformats.org/officeDocument/2006/math">
                     <m:r>
-                      <a:rPr lang="ru-RU" sz="2200" i="1"/>
+                      <a:rPr lang="ru-RU" sz="2200" i="1">
+                        <a:latin typeface="Cambria Math" panose="02040503050406030204" pitchFamily="18" charset="0"/>
+                      </a:rPr>
                       <m:t>𝐹</m:t>
                     </m:r>
                     <m:d>
                       <m:dPr>
                         <m:ctrlPr>
-                          <a:rPr lang="en-US" sz="2200" i="1"/>
+                          <a:rPr lang="en-US" sz="2200" i="1">
+                            <a:latin typeface="Cambria Math" panose="02040503050406030204" pitchFamily="18" charset="0"/>
+                          </a:rPr>
                         </m:ctrlPr>
                       </m:dPr>
                       <m:e>
                         <m:r>
-                          <a:rPr lang="ru-RU" sz="2200" i="1"/>
+                          <a:rPr lang="ru-RU" sz="2200" i="1">
+                            <a:latin typeface="Cambria Math" panose="02040503050406030204" pitchFamily="18" charset="0"/>
+                          </a:rPr>
                           <m:t>𝑘</m:t>
                         </m:r>
                         <m:r>
-                          <a:rPr lang="ru-RU" sz="2200" i="1"/>
+                          <a:rPr lang="ru-RU" sz="2200" i="1">
+                            <a:latin typeface="Cambria Math" panose="02040503050406030204" pitchFamily="18" charset="0"/>
+                          </a:rPr>
                           <m:t>,0</m:t>
                         </m:r>
                       </m:e>
                     </m:d>
                     <m:r>
-                      <a:rPr lang="ru-RU" sz="2200" i="1"/>
+                      <a:rPr lang="ru-RU" sz="2200" i="1">
+                        <a:latin typeface="Cambria Math" panose="02040503050406030204" pitchFamily="18" charset="0"/>
+                      </a:rPr>
                       <m:t>=0</m:t>
                     </m:r>
                   </m:oMath>
@@ -5622,28 +5803,38 @@
                 <a14:m>
                   <m:oMath xmlns:m="http://schemas.openxmlformats.org/officeDocument/2006/math">
                     <m:r>
-                      <a:rPr lang="ru-RU" sz="2200" i="1"/>
+                      <a:rPr lang="ru-RU" sz="2200" i="1">
+                        <a:latin typeface="Cambria Math" panose="02040503050406030204" pitchFamily="18" charset="0"/>
+                      </a:rPr>
                       <m:t>𝐹</m:t>
                     </m:r>
                     <m:d>
                       <m:dPr>
                         <m:ctrlPr>
-                          <a:rPr lang="en-US" sz="2200" i="1"/>
+                          <a:rPr lang="en-US" sz="2200" i="1">
+                            <a:latin typeface="Cambria Math" panose="02040503050406030204" pitchFamily="18" charset="0"/>
+                          </a:rPr>
                         </m:ctrlPr>
                       </m:dPr>
                       <m:e>
                         <m:r>
-                          <a:rPr lang="ru-RU" sz="2200" i="1"/>
+                          <a:rPr lang="ru-RU" sz="2200" i="1">
+                            <a:latin typeface="Cambria Math" panose="02040503050406030204" pitchFamily="18" charset="0"/>
+                          </a:rPr>
                           <m:t>0,</m:t>
                         </m:r>
                         <m:r>
-                          <a:rPr lang="ru-RU" sz="2200" i="1"/>
+                          <a:rPr lang="ru-RU" sz="2200" i="1">
+                            <a:latin typeface="Cambria Math" panose="02040503050406030204" pitchFamily="18" charset="0"/>
+                          </a:rPr>
                           <m:t>𝑠</m:t>
                         </m:r>
                       </m:e>
                     </m:d>
                     <m:r>
-                      <a:rPr lang="ru-RU" sz="2200" i="1"/>
+                      <a:rPr lang="ru-RU" sz="2200" i="1">
+                        <a:latin typeface="Cambria Math" panose="02040503050406030204" pitchFamily="18" charset="0"/>
+                      </a:rPr>
                       <m:t>=0</m:t>
                     </m:r>
                   </m:oMath>
@@ -5729,7 +5920,7 @@
             </p:txBody>
           </p:sp>
         </mc:Choice>
-        <mc:Fallback>
+        <mc:Fallback xmlns="">
           <p:sp>
             <p:nvSpPr>
               <p:cNvPr id="6" name="TextBox 5">
@@ -5816,8 +6007,8 @@
           </a:p>
         </p:txBody>
       </p:sp>
-      <mc:AlternateContent xmlns:mc="http://schemas.openxmlformats.org/markup-compatibility/2006">
-        <mc:Choice xmlns:a14="http://schemas.microsoft.com/office/drawing/2010/main" Requires="a14">
+      <mc:AlternateContent xmlns:mc="http://schemas.openxmlformats.org/markup-compatibility/2006" xmlns:a14="http://schemas.microsoft.com/office/drawing/2010/main">
+        <mc:Choice Requires="a14">
           <p:sp>
             <p:nvSpPr>
               <p:cNvPr id="10" name="TextBox 9">
@@ -5854,38 +6045,52 @@
                     </m:oMathParaPr>
                     <m:oMath xmlns:m="http://schemas.openxmlformats.org/officeDocument/2006/math">
                       <m:r>
-                        <a:rPr lang="en-US" sz="2500" i="1"/>
+                        <a:rPr lang="en-US" sz="2500" i="1">
+                          <a:latin typeface="Cambria Math" panose="02040503050406030204" pitchFamily="18" charset="0"/>
+                        </a:rPr>
                         <m:t>𝐹</m:t>
                       </m:r>
                       <m:d>
                         <m:dPr>
                           <m:ctrlPr>
-                            <a:rPr lang="en-US" sz="2500" i="1"/>
+                            <a:rPr lang="en-US" sz="2500" i="1">
+                              <a:latin typeface="Cambria Math" panose="02040503050406030204" pitchFamily="18" charset="0"/>
+                            </a:rPr>
                           </m:ctrlPr>
                         </m:dPr>
                         <m:e>
                           <m:r>
-                            <a:rPr lang="en-US" sz="2500" i="1"/>
+                            <a:rPr lang="en-US" sz="2500" i="1">
+                              <a:latin typeface="Cambria Math" panose="02040503050406030204" pitchFamily="18" charset="0"/>
+                            </a:rPr>
                             <m:t>𝑘</m:t>
                           </m:r>
                           <m:r>
-                            <a:rPr lang="ru-RU" sz="2500" i="1"/>
+                            <a:rPr lang="ru-RU" sz="2500" i="1">
+                              <a:latin typeface="Cambria Math" panose="02040503050406030204" pitchFamily="18" charset="0"/>
+                            </a:rPr>
                             <m:t>,</m:t>
                           </m:r>
                           <m:r>
-                            <a:rPr lang="en-US" sz="2500" i="1"/>
+                            <a:rPr lang="en-US" sz="2500" i="1">
+                              <a:latin typeface="Cambria Math" panose="02040503050406030204" pitchFamily="18" charset="0"/>
+                            </a:rPr>
                             <m:t>𝑠</m:t>
                           </m:r>
                         </m:e>
                       </m:d>
                       <m:r>
-                        <a:rPr lang="ru-RU" sz="2500" i="1"/>
+                        <a:rPr lang="ru-RU" sz="2500" i="1">
+                          <a:latin typeface="Cambria Math" panose="02040503050406030204" pitchFamily="18" charset="0"/>
+                        </a:rPr>
                         <m:t>=</m:t>
                       </m:r>
                       <m:func>
                         <m:funcPr>
                           <m:ctrlPr>
-                            <a:rPr lang="en-US" sz="2500" i="1"/>
+                            <a:rPr lang="en-US" sz="2500" i="1">
+                              <a:latin typeface="Cambria Math" panose="02040503050406030204" pitchFamily="18" charset="0"/>
+                            </a:rPr>
                           </m:ctrlPr>
                         </m:funcPr>
                         <m:fName>
@@ -5893,86 +6098,120 @@
                             <m:rPr>
                               <m:sty m:val="p"/>
                             </m:rPr>
-                            <a:rPr lang="ru-RU" sz="2500"/>
+                            <a:rPr lang="ru-RU" sz="2500">
+                              <a:latin typeface="Cambria Math" panose="02040503050406030204" pitchFamily="18" charset="0"/>
+                            </a:rPr>
                             <m:t>max</m:t>
                           </m:r>
                         </m:fName>
                         <m:e>
                           <m:r>
-                            <a:rPr lang="ru-RU" sz="2500" i="1"/>
+                            <a:rPr lang="ru-RU" sz="2500" i="1">
+                              <a:latin typeface="Cambria Math" panose="02040503050406030204" pitchFamily="18" charset="0"/>
+                            </a:rPr>
                             <m:t>(</m:t>
                           </m:r>
                           <m:r>
-                            <a:rPr lang="ru-RU" sz="2500" i="1"/>
+                            <a:rPr lang="ru-RU" sz="2500" i="1">
+                              <a:latin typeface="Cambria Math" panose="02040503050406030204" pitchFamily="18" charset="0"/>
+                            </a:rPr>
                             <m:t>𝐹</m:t>
                           </m:r>
                           <m:d>
                             <m:dPr>
                               <m:ctrlPr>
-                                <a:rPr lang="en-US" sz="2500" i="1"/>
+                                <a:rPr lang="en-US" sz="2500" i="1">
+                                  <a:latin typeface="Cambria Math" panose="02040503050406030204" pitchFamily="18" charset="0"/>
+                                </a:rPr>
                               </m:ctrlPr>
                             </m:dPr>
                             <m:e>
                               <m:r>
-                                <a:rPr lang="ru-RU" sz="2500" i="1"/>
+                                <a:rPr lang="ru-RU" sz="2500" i="1">
+                                  <a:latin typeface="Cambria Math" panose="02040503050406030204" pitchFamily="18" charset="0"/>
+                                </a:rPr>
                                 <m:t>𝑘</m:t>
                               </m:r>
                               <m:r>
-                                <a:rPr lang="ru-RU" sz="2500" i="1"/>
+                                <a:rPr lang="ru-RU" sz="2500" i="1">
+                                  <a:latin typeface="Cambria Math" panose="02040503050406030204" pitchFamily="18" charset="0"/>
+                                </a:rPr>
                                 <m:t>−1,</m:t>
                               </m:r>
                               <m:r>
-                                <a:rPr lang="ru-RU" sz="2500" i="1"/>
+                                <a:rPr lang="ru-RU" sz="2500" i="1">
+                                  <a:latin typeface="Cambria Math" panose="02040503050406030204" pitchFamily="18" charset="0"/>
+                                </a:rPr>
                                 <m:t>𝑠</m:t>
                               </m:r>
                             </m:e>
                           </m:d>
                           <m:r>
-                            <a:rPr lang="ru-RU" sz="2500" i="1"/>
+                            <a:rPr lang="ru-RU" sz="2500" i="1">
+                              <a:latin typeface="Cambria Math" panose="02040503050406030204" pitchFamily="18" charset="0"/>
+                            </a:rPr>
                             <m:t>,</m:t>
                           </m:r>
                           <m:r>
-                            <a:rPr lang="ru-RU" sz="2500" i="1"/>
+                            <a:rPr lang="ru-RU" sz="2500" i="1">
+                              <a:latin typeface="Cambria Math" panose="02040503050406030204" pitchFamily="18" charset="0"/>
+                            </a:rPr>
                             <m:t>𝐹</m:t>
                           </m:r>
                           <m:d>
                             <m:dPr>
                               <m:ctrlPr>
-                                <a:rPr lang="en-US" sz="2500" i="1"/>
+                                <a:rPr lang="en-US" sz="2500" i="1">
+                                  <a:latin typeface="Cambria Math" panose="02040503050406030204" pitchFamily="18" charset="0"/>
+                                </a:rPr>
                               </m:ctrlPr>
                             </m:dPr>
                             <m:e>
                               <m:r>
-                                <a:rPr lang="ru-RU" sz="2500" i="1"/>
+                                <a:rPr lang="ru-RU" sz="2500" i="1">
+                                  <a:latin typeface="Cambria Math" panose="02040503050406030204" pitchFamily="18" charset="0"/>
+                                </a:rPr>
                                 <m:t>𝑘</m:t>
                               </m:r>
                               <m:r>
-                                <a:rPr lang="ru-RU" sz="2500" i="1"/>
+                                <a:rPr lang="ru-RU" sz="2500" i="1">
+                                  <a:latin typeface="Cambria Math" panose="02040503050406030204" pitchFamily="18" charset="0"/>
+                                </a:rPr>
                                 <m:t>−1,</m:t>
                               </m:r>
                               <m:r>
-                                <a:rPr lang="ru-RU" sz="2500" i="1"/>
+                                <a:rPr lang="ru-RU" sz="2500" i="1">
+                                  <a:latin typeface="Cambria Math" panose="02040503050406030204" pitchFamily="18" charset="0"/>
+                                </a:rPr>
                                 <m:t>𝑠</m:t>
                               </m:r>
                               <m:r>
-                                <a:rPr lang="ru-RU" sz="2500" i="1"/>
+                                <a:rPr lang="ru-RU" sz="2500" i="1">
+                                  <a:latin typeface="Cambria Math" panose="02040503050406030204" pitchFamily="18" charset="0"/>
+                                </a:rPr>
                                 <m:t>−</m:t>
                               </m:r>
                               <m:sSub>
                                 <m:sSubPr>
                                   <m:ctrlPr>
-                                    <a:rPr lang="en-US" sz="2500" i="1"/>
+                                    <a:rPr lang="en-US" sz="2500" i="1">
+                                      <a:latin typeface="Cambria Math" panose="02040503050406030204" pitchFamily="18" charset="0"/>
+                                    </a:rPr>
                                   </m:ctrlPr>
                                 </m:sSubPr>
                                 <m:e>
                                   <m:r>
-                                    <a:rPr lang="ru-RU" sz="2500" i="1"/>
+                                    <a:rPr lang="ru-RU" sz="2500" i="1">
+                                      <a:latin typeface="Cambria Math" panose="02040503050406030204" pitchFamily="18" charset="0"/>
+                                    </a:rPr>
                                     <m:t>𝑤</m:t>
                                   </m:r>
                                 </m:e>
                                 <m:sub>
                                   <m:r>
-                                    <a:rPr lang="ru-RU" sz="2500" i="1"/>
+                                    <a:rPr lang="ru-RU" sz="2500" i="1">
+                                      <a:latin typeface="Cambria Math" panose="02040503050406030204" pitchFamily="18" charset="0"/>
+                                    </a:rPr>
                                     <m:t>𝑘</m:t>
                                   </m:r>
                                 </m:sub>
@@ -5980,30 +6219,40 @@
                             </m:e>
                           </m:d>
                           <m:r>
-                            <a:rPr lang="ru-RU" sz="2500" i="1"/>
+                            <a:rPr lang="ru-RU" sz="2500" i="1">
+                              <a:latin typeface="Cambria Math" panose="02040503050406030204" pitchFamily="18" charset="0"/>
+                            </a:rPr>
                             <m:t>+</m:t>
                           </m:r>
                           <m:sSub>
                             <m:sSubPr>
                               <m:ctrlPr>
-                                <a:rPr lang="en-US" sz="2500" i="1"/>
+                                <a:rPr lang="en-US" sz="2500" i="1">
+                                  <a:latin typeface="Cambria Math" panose="02040503050406030204" pitchFamily="18" charset="0"/>
+                                </a:rPr>
                               </m:ctrlPr>
                             </m:sSubPr>
                             <m:e>
                               <m:r>
-                                <a:rPr lang="ru-RU" sz="2500" i="1"/>
+                                <a:rPr lang="ru-RU" sz="2500" i="1">
+                                  <a:latin typeface="Cambria Math" panose="02040503050406030204" pitchFamily="18" charset="0"/>
+                                </a:rPr>
                                 <m:t>𝑝</m:t>
                               </m:r>
                             </m:e>
                             <m:sub>
                               <m:r>
-                                <a:rPr lang="ru-RU" sz="2500" i="1"/>
+                                <a:rPr lang="ru-RU" sz="2500" i="1">
+                                  <a:latin typeface="Cambria Math" panose="02040503050406030204" pitchFamily="18" charset="0"/>
+                                </a:rPr>
                                 <m:t>𝑘</m:t>
                               </m:r>
                             </m:sub>
                           </m:sSub>
                           <m:r>
-                            <a:rPr lang="ru-RU" sz="2500" i="1"/>
+                            <a:rPr lang="ru-RU" sz="2500" i="1">
+                              <a:latin typeface="Cambria Math" panose="02040503050406030204" pitchFamily="18" charset="0"/>
+                            </a:rPr>
                             <m:t>)</m:t>
                           </m:r>
                         </m:e>
@@ -6022,7 +6271,7 @@
             </p:txBody>
           </p:sp>
         </mc:Choice>
-        <mc:Fallback>
+        <mc:Fallback xmlns="">
           <p:sp>
             <p:nvSpPr>
               <p:cNvPr id="10" name="TextBox 9">
@@ -6067,8 +6316,8 @@
           </p:sp>
         </mc:Fallback>
       </mc:AlternateContent>
-      <mc:AlternateContent xmlns:mc="http://schemas.openxmlformats.org/markup-compatibility/2006">
-        <mc:Choice xmlns:a14="http://schemas.microsoft.com/office/drawing/2010/main" Requires="a14">
+      <mc:AlternateContent xmlns:mc="http://schemas.openxmlformats.org/markup-compatibility/2006" xmlns:a14="http://schemas.microsoft.com/office/drawing/2010/main">
+        <mc:Choice Requires="a14">
           <p:sp>
             <p:nvSpPr>
               <p:cNvPr id="8" name="TextBox 7">
@@ -6200,7 +6449,7 @@
             </p:txBody>
           </p:sp>
         </mc:Choice>
-        <mc:Fallback>
+        <mc:Fallback xmlns="">
           <p:sp>
             <p:nvSpPr>
               <p:cNvPr id="8" name="TextBox 7">
@@ -6406,8 +6655,8 @@
           </a:p>
         </p:txBody>
       </p:sp>
-      <mc:AlternateContent xmlns:mc="http://schemas.openxmlformats.org/markup-compatibility/2006">
-        <mc:Choice xmlns:a14="http://schemas.microsoft.com/office/drawing/2010/main" Requires="a14">
+      <mc:AlternateContent xmlns:mc="http://schemas.openxmlformats.org/markup-compatibility/2006" xmlns:a14="http://schemas.microsoft.com/office/drawing/2010/main">
+        <mc:Choice Requires="a14">
           <p:sp>
             <p:nvSpPr>
               <p:cNvPr id="13" name="TextBox 12">
@@ -6586,7 +6835,7 @@
             </p:txBody>
           </p:sp>
         </mc:Choice>
-        <mc:Fallback>
+        <mc:Fallback xmlns="">
           <p:sp>
             <p:nvSpPr>
               <p:cNvPr id="13" name="TextBox 12">
@@ -6792,8 +7041,8 @@
           </a:p>
         </p:txBody>
       </p:sp>
-      <mc:AlternateContent xmlns:mc="http://schemas.openxmlformats.org/markup-compatibility/2006">
-        <mc:Choice xmlns:a14="http://schemas.microsoft.com/office/drawing/2010/main" Requires="a14">
+      <mc:AlternateContent xmlns:mc="http://schemas.openxmlformats.org/markup-compatibility/2006" xmlns:a14="http://schemas.microsoft.com/office/drawing/2010/main">
+        <mc:Choice Requires="a14">
           <p:sp>
             <p:nvSpPr>
               <p:cNvPr id="13" name="TextBox 12">
@@ -6833,7 +7082,9 @@
                 <a14:m>
                   <m:oMath xmlns:m="http://schemas.openxmlformats.org/officeDocument/2006/math">
                     <m:r>
-                      <a:rPr lang="ru-RU" sz="2200" i="1"/>
+                      <a:rPr lang="ru-RU" sz="2200" i="1">
+                        <a:latin typeface="Cambria Math" panose="02040503050406030204" pitchFamily="18" charset="0"/>
+                      </a:rPr>
                       <m:t>𝑆</m:t>
                     </m:r>
                   </m:oMath>
@@ -7083,7 +7334,7 @@
             </p:txBody>
           </p:sp>
         </mc:Choice>
-        <mc:Fallback>
+        <mc:Fallback xmlns="">
           <p:sp>
             <p:nvSpPr>
               <p:cNvPr id="13" name="TextBox 12">
@@ -7144,8 +7395,8 @@
             </p:nvSpPr>
             <p:spPr>
               <a:xfrm>
-                <a:off x="3048762" y="3281052"/>
-                <a:ext cx="6094476" cy="477054"/>
+                <a:off x="2838545" y="3297049"/>
+                <a:ext cx="6899910" cy="477054"/>
               </a:xfrm>
               <a:prstGeom prst="rect">
                 <a:avLst/>
@@ -7447,6 +7698,101 @@
                           </m:sSub>
                         </m:e>
                       </m:d>
+                      <m:r>
+                        <a:rPr lang="ru-RU" sz="2500" b="0" i="1" smtClean="0">
+                          <a:solidFill>
+                            <a:schemeClr val="tx1"/>
+                          </a:solidFill>
+                          <a:latin typeface="Cambria Math" panose="02040503050406030204" pitchFamily="18" charset="0"/>
+                        </a:rPr>
+                        <m:t>+…+</m:t>
+                      </m:r>
+                      <m:sSub>
+                        <m:sSubPr>
+                          <m:ctrlPr>
+                            <a:rPr lang="ru-RU" sz="2500" b="0" i="1" smtClean="0">
+                              <a:solidFill>
+                                <a:schemeClr val="tx1"/>
+                              </a:solidFill>
+                              <a:latin typeface="Cambria Math" panose="02040503050406030204" pitchFamily="18" charset="0"/>
+                            </a:rPr>
+                          </m:ctrlPr>
+                        </m:sSubPr>
+                        <m:e>
+                          <m:r>
+                            <a:rPr lang="ru-RU" sz="2500" b="0" i="1" smtClean="0">
+                              <a:solidFill>
+                                <a:schemeClr val="tx1"/>
+                              </a:solidFill>
+                              <a:latin typeface="Cambria Math" panose="02040503050406030204" pitchFamily="18" charset="0"/>
+                            </a:rPr>
+                            <m:t>П</m:t>
+                          </m:r>
+                        </m:e>
+                        <m:sub>
+                          <m:r>
+                            <a:rPr lang="en-US" sz="2500" b="0" i="1" smtClean="0">
+                              <a:solidFill>
+                                <a:schemeClr val="tx1"/>
+                              </a:solidFill>
+                              <a:latin typeface="Cambria Math" panose="02040503050406030204" pitchFamily="18" charset="0"/>
+                            </a:rPr>
+                            <m:t>𝑁</m:t>
+                          </m:r>
+                        </m:sub>
+                      </m:sSub>
+                      <m:r>
+                        <a:rPr lang="en-US" sz="2500" b="0" i="1" smtClean="0">
+                          <a:solidFill>
+                            <a:schemeClr val="tx1"/>
+                          </a:solidFill>
+                          <a:latin typeface="Cambria Math" panose="02040503050406030204" pitchFamily="18" charset="0"/>
+                        </a:rPr>
+                        <m:t>(</m:t>
+                      </m:r>
+                      <m:sSub>
+                        <m:sSubPr>
+                          <m:ctrlPr>
+                            <a:rPr lang="en-US" sz="2500" b="0" i="1" smtClean="0">
+                              <a:solidFill>
+                                <a:schemeClr val="tx1"/>
+                              </a:solidFill>
+                              <a:latin typeface="Cambria Math" panose="02040503050406030204" pitchFamily="18" charset="0"/>
+                            </a:rPr>
+                          </m:ctrlPr>
+                        </m:sSubPr>
+                        <m:e>
+                          <m:r>
+                            <a:rPr lang="en-US" sz="2500" b="0" i="1" smtClean="0">
+                              <a:solidFill>
+                                <a:schemeClr val="tx1"/>
+                              </a:solidFill>
+                              <a:latin typeface="Cambria Math" panose="02040503050406030204" pitchFamily="18" charset="0"/>
+                            </a:rPr>
+                            <m:t>𝑥</m:t>
+                          </m:r>
+                        </m:e>
+                        <m:sub>
+                          <m:r>
+                            <a:rPr lang="en-US" sz="2500" b="0" i="1" smtClean="0">
+                              <a:solidFill>
+                                <a:schemeClr val="tx1"/>
+                              </a:solidFill>
+                              <a:latin typeface="Cambria Math" panose="02040503050406030204" pitchFamily="18" charset="0"/>
+                            </a:rPr>
+                            <m:t>𝑁</m:t>
+                          </m:r>
+                        </m:sub>
+                      </m:sSub>
+                      <m:r>
+                        <a:rPr lang="en-US" sz="2500" b="0" i="1" smtClean="0">
+                          <a:solidFill>
+                            <a:schemeClr val="tx1"/>
+                          </a:solidFill>
+                          <a:latin typeface="Cambria Math" panose="02040503050406030204" pitchFamily="18" charset="0"/>
+                        </a:rPr>
+                        <m:t>)</m:t>
+                      </m:r>
                     </m:oMath>
                   </m:oMathPara>
                 </a14:m>
@@ -7476,8 +7822,8 @@
             </p:nvSpPr>
             <p:spPr>
               <a:xfrm>
-                <a:off x="3048762" y="3281052"/>
-                <a:ext cx="6094476" cy="477054"/>
+                <a:off x="2838545" y="3297049"/>
+                <a:ext cx="6899910" cy="477054"/>
               </a:xfrm>
               <a:prstGeom prst="rect">
                 <a:avLst/>
@@ -7485,7 +7831,7 @@
               <a:blipFill>
                 <a:blip r:embed="rId3"/>
                 <a:stretch>
-                  <a:fillRect b="-2564"/>
+                  <a:fillRect b="-17949"/>
                 </a:stretch>
               </a:blipFill>
             </p:spPr>
@@ -7538,7 +7884,7 @@
               </a:tabLst>
             </a:pPr>
             <a:r>
-              <a:rPr lang="ru-RU" sz="2200">
+              <a:rPr lang="ru-RU" sz="2200" dirty="0">
                 <a:effectLst/>
                 <a:latin typeface="Cambria" panose="02040503050406030204" pitchFamily="18" charset="0"/>
                 <a:ea typeface="Cambria" panose="02040503050406030204" pitchFamily="18" charset="0"/>
@@ -7546,23 +7892,18 @@
               <a:t>Согласно принципу оптимальности Беллмана, управления на каждом шаге нужно выбирать так, чтобы оптимальной была сумма выигрышей на всех оставшихся до конца процесса шагах, включая выигрыш на данном шаге. Тогда функциональное уравнение Беллмана примет вид</a:t>
             </a:r>
             <a:r>
-              <a:rPr lang="en-US" sz="2200">
+              <a:rPr lang="en-US" sz="2200" dirty="0">
                 <a:effectLst/>
                 <a:latin typeface="Cambria" panose="02040503050406030204" pitchFamily="18" charset="0"/>
                 <a:ea typeface="Cambria" panose="02040503050406030204" pitchFamily="18" charset="0"/>
               </a:rPr>
               <a:t>:</a:t>
             </a:r>
-            <a:endParaRPr lang="en-US" sz="2200" dirty="0">
-              <a:effectLst/>
-              <a:latin typeface="Cambria" panose="02040503050406030204" pitchFamily="18" charset="0"/>
-              <a:ea typeface="Cambria" panose="02040503050406030204" pitchFamily="18" charset="0"/>
-            </a:endParaRPr>
           </a:p>
         </p:txBody>
       </p:sp>
-      <mc:AlternateContent xmlns:mc="http://schemas.openxmlformats.org/markup-compatibility/2006">
-        <mc:Choice xmlns:a14="http://schemas.microsoft.com/office/drawing/2010/main" Requires="a14">
+      <mc:AlternateContent xmlns:mc="http://schemas.openxmlformats.org/markup-compatibility/2006" xmlns:a14="http://schemas.microsoft.com/office/drawing/2010/main">
+        <mc:Choice Requires="a14">
           <p:sp>
             <p:nvSpPr>
               <p:cNvPr id="12" name="TextBox 11">
@@ -7913,7 +8254,7 @@
             </p:txBody>
           </p:sp>
         </mc:Choice>
-        <mc:Fallback>
+        <mc:Fallback xmlns="">
           <p:sp>
             <p:nvSpPr>
               <p:cNvPr id="12" name="TextBox 11">
@@ -9098,8 +9439,8 @@
           </a:p>
         </p:txBody>
       </p:sp>
-      <mc:AlternateContent xmlns:mc="http://schemas.openxmlformats.org/markup-compatibility/2006">
-        <mc:Choice xmlns:a14="http://schemas.microsoft.com/office/drawing/2010/main" Requires="a14">
+      <mc:AlternateContent xmlns:mc="http://schemas.openxmlformats.org/markup-compatibility/2006" xmlns:a14="http://schemas.microsoft.com/office/drawing/2010/main">
+        <mc:Choice Requires="a14">
           <p:sp>
             <p:nvSpPr>
               <p:cNvPr id="8" name="TextBox 7">
@@ -9295,7 +9636,7 @@
             </p:txBody>
           </p:sp>
         </mc:Choice>
-        <mc:Fallback>
+        <mc:Fallback xmlns="">
           <p:sp>
             <p:nvSpPr>
               <p:cNvPr id="8" name="TextBox 7">
@@ -9755,8 +10096,8 @@
           </a:p>
         </p:txBody>
       </p:sp>
-      <mc:AlternateContent xmlns:mc="http://schemas.openxmlformats.org/markup-compatibility/2006">
-        <mc:Choice xmlns:a14="http://schemas.microsoft.com/office/drawing/2010/main" Requires="a14">
+      <mc:AlternateContent xmlns:mc="http://schemas.openxmlformats.org/markup-compatibility/2006" xmlns:a14="http://schemas.microsoft.com/office/drawing/2010/main">
+        <mc:Choice Requires="a14">
           <p:sp>
             <p:nvSpPr>
               <p:cNvPr id="9" name="TextBox 8">
@@ -10447,7 +10788,7 @@
             </p:txBody>
           </p:sp>
         </mc:Choice>
-        <mc:Fallback>
+        <mc:Fallback xmlns="">
           <p:sp>
             <p:nvSpPr>
               <p:cNvPr id="9" name="TextBox 8">
@@ -10492,8 +10833,8 @@
           </p:sp>
         </mc:Fallback>
       </mc:AlternateContent>
-      <mc:AlternateContent xmlns:mc="http://schemas.openxmlformats.org/markup-compatibility/2006">
-        <mc:Choice xmlns:a14="http://schemas.microsoft.com/office/drawing/2010/main" Requires="a14">
+      <mc:AlternateContent xmlns:mc="http://schemas.openxmlformats.org/markup-compatibility/2006" xmlns:a14="http://schemas.microsoft.com/office/drawing/2010/main">
+        <mc:Choice Requires="a14">
           <p:sp>
             <p:nvSpPr>
               <p:cNvPr id="11" name="TextBox 10">
@@ -10812,8 +11153,8 @@
                     <m:sSub>
                       <m:sSubPr>
                         <m:ctrlPr>
-                          <a:rPr lang="en-US" sz="2200">
-                            <a:latin typeface="Cambria" panose="02040503050406030204" pitchFamily="18" charset="0"/>
+                          <a:rPr lang="en-US" sz="2200" i="1">
+                            <a:latin typeface="Cambria Math" panose="02040503050406030204" pitchFamily="18" charset="0"/>
                             <a:ea typeface="Cambria" panose="02040503050406030204" pitchFamily="18" charset="0"/>
                           </a:rPr>
                         </m:ctrlPr>
@@ -10821,7 +11162,7 @@
                       <m:e>
                         <m:r>
                           <a:rPr lang="ru-RU" sz="2200">
-                            <a:latin typeface="Cambria" panose="02040503050406030204" pitchFamily="18" charset="0"/>
+                            <a:latin typeface="Cambria Math" panose="02040503050406030204" pitchFamily="18" charset="0"/>
                             <a:ea typeface="Cambria" panose="02040503050406030204" pitchFamily="18" charset="0"/>
                           </a:rPr>
                           <m:t>𝐵</m:t>
@@ -10830,7 +11171,7 @@
                       <m:sub>
                         <m:r>
                           <a:rPr lang="en-US" sz="2200">
-                            <a:latin typeface="Cambria" panose="02040503050406030204" pitchFamily="18" charset="0"/>
+                            <a:latin typeface="Cambria Math" panose="02040503050406030204" pitchFamily="18" charset="0"/>
                             <a:ea typeface="Cambria" panose="02040503050406030204" pitchFamily="18" charset="0"/>
                           </a:rPr>
                           <m:t>𝑖</m:t>
@@ -10840,8 +11181,8 @@
                     <m:d>
                       <m:dPr>
                         <m:ctrlPr>
-                          <a:rPr lang="en-US" sz="2200">
-                            <a:latin typeface="Cambria" panose="02040503050406030204" pitchFamily="18" charset="0"/>
+                          <a:rPr lang="en-US" sz="2200" i="1">
+                            <a:latin typeface="Cambria Math" panose="02040503050406030204" pitchFamily="18" charset="0"/>
                             <a:ea typeface="Cambria" panose="02040503050406030204" pitchFamily="18" charset="0"/>
                           </a:rPr>
                         </m:ctrlPr>
@@ -10850,8 +11191,8 @@
                         <m:sSub>
                           <m:sSubPr>
                             <m:ctrlPr>
-                              <a:rPr lang="en-US" sz="2200">
-                                <a:latin typeface="Cambria" panose="02040503050406030204" pitchFamily="18" charset="0"/>
+                              <a:rPr lang="en-US" sz="2200" i="1">
+                                <a:latin typeface="Cambria Math" panose="02040503050406030204" pitchFamily="18" charset="0"/>
                                 <a:ea typeface="Cambria" panose="02040503050406030204" pitchFamily="18" charset="0"/>
                               </a:rPr>
                             </m:ctrlPr>
@@ -10859,7 +11200,7 @@
                           <m:e>
                             <m:r>
                               <a:rPr lang="ru-RU" sz="2200">
-                                <a:latin typeface="Cambria" panose="02040503050406030204" pitchFamily="18" charset="0"/>
+                                <a:latin typeface="Cambria Math" panose="02040503050406030204" pitchFamily="18" charset="0"/>
                                 <a:ea typeface="Cambria" panose="02040503050406030204" pitchFamily="18" charset="0"/>
                               </a:rPr>
                               <m:t>𝑥</m:t>
@@ -10868,7 +11209,7 @@
                           <m:sub>
                             <m:r>
                               <a:rPr lang="ru-RU" sz="2200">
-                                <a:latin typeface="Cambria" panose="02040503050406030204" pitchFamily="18" charset="0"/>
+                                <a:latin typeface="Cambria Math" panose="02040503050406030204" pitchFamily="18" charset="0"/>
                                 <a:ea typeface="Cambria" panose="02040503050406030204" pitchFamily="18" charset="0"/>
                               </a:rPr>
                               <m:t>𝑖</m:t>
@@ -10879,28 +11220,28 @@
                     </m:d>
                     <m:r>
                       <a:rPr lang="ru-RU" sz="2200">
-                        <a:latin typeface="Cambria" panose="02040503050406030204" pitchFamily="18" charset="0"/>
+                        <a:latin typeface="Cambria Math" panose="02040503050406030204" pitchFamily="18" charset="0"/>
                         <a:ea typeface="Cambria" panose="02040503050406030204" pitchFamily="18" charset="0"/>
                       </a:rPr>
                       <m:t>,</m:t>
                     </m:r>
                     <m:r>
                       <a:rPr lang="ru-RU" sz="2200">
-                        <a:latin typeface="Cambria" panose="02040503050406030204" pitchFamily="18" charset="0"/>
+                        <a:latin typeface="Cambria Math" panose="02040503050406030204" pitchFamily="18" charset="0"/>
                         <a:ea typeface="Cambria" panose="02040503050406030204" pitchFamily="18" charset="0"/>
                       </a:rPr>
                       <m:t>𝑖</m:t>
                     </m:r>
                     <m:r>
                       <a:rPr lang="ru-RU" sz="2200">
-                        <a:latin typeface="Cambria" panose="02040503050406030204" pitchFamily="18" charset="0"/>
+                        <a:latin typeface="Cambria Math" panose="02040503050406030204" pitchFamily="18" charset="0"/>
                         <a:ea typeface="Cambria" panose="02040503050406030204" pitchFamily="18" charset="0"/>
                       </a:rPr>
                       <m:t>=0,1, …, </m:t>
                     </m:r>
                     <m:r>
                       <a:rPr lang="ru-RU" sz="2200">
-                        <a:latin typeface="Cambria" panose="02040503050406030204" pitchFamily="18" charset="0"/>
+                        <a:latin typeface="Cambria Math" panose="02040503050406030204" pitchFamily="18" charset="0"/>
                         <a:ea typeface="Cambria" panose="02040503050406030204" pitchFamily="18" charset="0"/>
                       </a:rPr>
                       <m:t>𝑛</m:t>
@@ -10919,8 +11260,8 @@
                     <m:sSub>
                       <m:sSubPr>
                         <m:ctrlPr>
-                          <a:rPr lang="en-US" sz="2200">
-                            <a:latin typeface="Cambria" panose="02040503050406030204" pitchFamily="18" charset="0"/>
+                          <a:rPr lang="en-US" sz="2200" i="1">
+                            <a:latin typeface="Cambria Math" panose="02040503050406030204" pitchFamily="18" charset="0"/>
                             <a:ea typeface="Cambria" panose="02040503050406030204" pitchFamily="18" charset="0"/>
                           </a:rPr>
                         </m:ctrlPr>
@@ -10928,7 +11269,7 @@
                       <m:e>
                         <m:r>
                           <a:rPr lang="ru-RU" sz="2200">
-                            <a:latin typeface="Cambria" panose="02040503050406030204" pitchFamily="18" charset="0"/>
+                            <a:latin typeface="Cambria Math" panose="02040503050406030204" pitchFamily="18" charset="0"/>
                             <a:ea typeface="Cambria" panose="02040503050406030204" pitchFamily="18" charset="0"/>
                           </a:rPr>
                           <m:t>𝑧</m:t>
@@ -10937,14 +11278,14 @@
                       <m:sub>
                         <m:r>
                           <a:rPr lang="ru-RU" sz="2200">
-                            <a:latin typeface="Cambria" panose="02040503050406030204" pitchFamily="18" charset="0"/>
+                            <a:latin typeface="Cambria Math" panose="02040503050406030204" pitchFamily="18" charset="0"/>
                             <a:ea typeface="Cambria" panose="02040503050406030204" pitchFamily="18" charset="0"/>
                           </a:rPr>
                           <m:t>𝑖</m:t>
                         </m:r>
                         <m:r>
                           <a:rPr lang="ru-RU" sz="2200">
-                            <a:latin typeface="Cambria" panose="02040503050406030204" pitchFamily="18" charset="0"/>
+                            <a:latin typeface="Cambria Math" panose="02040503050406030204" pitchFamily="18" charset="0"/>
                             <a:ea typeface="Cambria" panose="02040503050406030204" pitchFamily="18" charset="0"/>
                           </a:rPr>
                           <m:t>+1</m:t>
@@ -10954,8 +11295,8 @@
                     <m:d>
                       <m:dPr>
                         <m:ctrlPr>
-                          <a:rPr lang="en-US" sz="2200">
-                            <a:latin typeface="Cambria" panose="02040503050406030204" pitchFamily="18" charset="0"/>
+                          <a:rPr lang="en-US" sz="2200" i="1">
+                            <a:latin typeface="Cambria Math" panose="02040503050406030204" pitchFamily="18" charset="0"/>
                             <a:ea typeface="Cambria" panose="02040503050406030204" pitchFamily="18" charset="0"/>
                           </a:rPr>
                         </m:ctrlPr>
@@ -10964,8 +11305,8 @@
                         <m:sSub>
                           <m:sSubPr>
                             <m:ctrlPr>
-                              <a:rPr lang="en-US" sz="2200">
-                                <a:latin typeface="Cambria" panose="02040503050406030204" pitchFamily="18" charset="0"/>
+                              <a:rPr lang="en-US" sz="2200" i="1">
+                                <a:latin typeface="Cambria Math" panose="02040503050406030204" pitchFamily="18" charset="0"/>
                                 <a:ea typeface="Cambria" panose="02040503050406030204" pitchFamily="18" charset="0"/>
                               </a:rPr>
                             </m:ctrlPr>
@@ -10973,7 +11314,7 @@
                           <m:e>
                             <m:r>
                               <a:rPr lang="ru-RU" sz="2200">
-                                <a:latin typeface="Cambria" panose="02040503050406030204" pitchFamily="18" charset="0"/>
+                                <a:latin typeface="Cambria Math" panose="02040503050406030204" pitchFamily="18" charset="0"/>
                                 <a:ea typeface="Cambria" panose="02040503050406030204" pitchFamily="18" charset="0"/>
                               </a:rPr>
                               <m:t>𝑥</m:t>
@@ -10982,7 +11323,7 @@
                           <m:sub>
                             <m:r>
                               <a:rPr lang="ru-RU" sz="2200">
-                                <a:latin typeface="Cambria" panose="02040503050406030204" pitchFamily="18" charset="0"/>
+                                <a:latin typeface="Cambria Math" panose="02040503050406030204" pitchFamily="18" charset="0"/>
                                 <a:ea typeface="Cambria" panose="02040503050406030204" pitchFamily="18" charset="0"/>
                               </a:rPr>
                               <m:t>𝑖</m:t>
@@ -10991,7 +11332,7 @@
                         </m:sSub>
                         <m:r>
                           <a:rPr lang="ru-RU" sz="2200">
-                            <a:latin typeface="Cambria" panose="02040503050406030204" pitchFamily="18" charset="0"/>
+                            <a:latin typeface="Cambria Math" panose="02040503050406030204" pitchFamily="18" charset="0"/>
                             <a:ea typeface="Cambria" panose="02040503050406030204" pitchFamily="18" charset="0"/>
                           </a:rPr>
                           <m:t>,</m:t>
@@ -10999,8 +11340,8 @@
                         <m:sSub>
                           <m:sSubPr>
                             <m:ctrlPr>
-                              <a:rPr lang="en-US" sz="2200">
-                                <a:latin typeface="Cambria" panose="02040503050406030204" pitchFamily="18" charset="0"/>
+                              <a:rPr lang="en-US" sz="2200" i="1">
+                                <a:latin typeface="Cambria Math" panose="02040503050406030204" pitchFamily="18" charset="0"/>
                                 <a:ea typeface="Cambria" panose="02040503050406030204" pitchFamily="18" charset="0"/>
                               </a:rPr>
                             </m:ctrlPr>
@@ -11008,7 +11349,7 @@
                           <m:e>
                             <m:r>
                               <a:rPr lang="ru-RU" sz="2200">
-                                <a:latin typeface="Cambria" panose="02040503050406030204" pitchFamily="18" charset="0"/>
+                                <a:latin typeface="Cambria Math" panose="02040503050406030204" pitchFamily="18" charset="0"/>
                                 <a:ea typeface="Cambria" panose="02040503050406030204" pitchFamily="18" charset="0"/>
                               </a:rPr>
                               <m:t>𝑢</m:t>
@@ -11017,14 +11358,14 @@
                           <m:sub>
                             <m:r>
                               <a:rPr lang="ru-RU" sz="2200">
-                                <a:latin typeface="Cambria" panose="02040503050406030204" pitchFamily="18" charset="0"/>
+                                <a:latin typeface="Cambria Math" panose="02040503050406030204" pitchFamily="18" charset="0"/>
                                 <a:ea typeface="Cambria" panose="02040503050406030204" pitchFamily="18" charset="0"/>
                               </a:rPr>
                               <m:t>𝑖</m:t>
                             </m:r>
                             <m:r>
                               <a:rPr lang="ru-RU" sz="2200">
-                                <a:latin typeface="Cambria" panose="02040503050406030204" pitchFamily="18" charset="0"/>
+                                <a:latin typeface="Cambria Math" panose="02040503050406030204" pitchFamily="18" charset="0"/>
                                 <a:ea typeface="Cambria" panose="02040503050406030204" pitchFamily="18" charset="0"/>
                               </a:rPr>
                               <m:t>+1</m:t>
@@ -11035,7 +11376,7 @@
                     </m:d>
                     <m:r>
                       <a:rPr lang="ru-RU" sz="2200">
-                        <a:latin typeface="Cambria" panose="02040503050406030204" pitchFamily="18" charset="0"/>
+                        <a:latin typeface="Cambria Math" panose="02040503050406030204" pitchFamily="18" charset="0"/>
                         <a:ea typeface="Cambria" panose="02040503050406030204" pitchFamily="18" charset="0"/>
                       </a:rPr>
                       <m:t>+…+</m:t>
@@ -11043,8 +11384,8 @@
                     <m:sSub>
                       <m:sSubPr>
                         <m:ctrlPr>
-                          <a:rPr lang="en-US" sz="2200">
-                            <a:latin typeface="Cambria" panose="02040503050406030204" pitchFamily="18" charset="0"/>
+                          <a:rPr lang="en-US" sz="2200" i="1">
+                            <a:latin typeface="Cambria Math" panose="02040503050406030204" pitchFamily="18" charset="0"/>
                             <a:ea typeface="Cambria" panose="02040503050406030204" pitchFamily="18" charset="0"/>
                           </a:rPr>
                         </m:ctrlPr>
@@ -11052,7 +11393,7 @@
                       <m:e>
                         <m:r>
                           <a:rPr lang="ru-RU" sz="2200">
-                            <a:latin typeface="Cambria" panose="02040503050406030204" pitchFamily="18" charset="0"/>
+                            <a:latin typeface="Cambria Math" panose="02040503050406030204" pitchFamily="18" charset="0"/>
                             <a:ea typeface="Cambria" panose="02040503050406030204" pitchFamily="18" charset="0"/>
                           </a:rPr>
                           <m:t>𝑧</m:t>
@@ -11061,7 +11402,7 @@
                       <m:sub>
                         <m:r>
                           <a:rPr lang="ru-RU" sz="2200">
-                            <a:latin typeface="Cambria" panose="02040503050406030204" pitchFamily="18" charset="0"/>
+                            <a:latin typeface="Cambria Math" panose="02040503050406030204" pitchFamily="18" charset="0"/>
                             <a:ea typeface="Cambria" panose="02040503050406030204" pitchFamily="18" charset="0"/>
                           </a:rPr>
                           <m:t>𝑛</m:t>
@@ -11070,7 +11411,7 @@
                     </m:sSub>
                     <m:r>
                       <a:rPr lang="ru-RU" sz="2200">
-                        <a:latin typeface="Cambria" panose="02040503050406030204" pitchFamily="18" charset="0"/>
+                        <a:latin typeface="Cambria Math" panose="02040503050406030204" pitchFamily="18" charset="0"/>
                         <a:ea typeface="Cambria" panose="02040503050406030204" pitchFamily="18" charset="0"/>
                       </a:rPr>
                       <m:t>(</m:t>
@@ -11078,8 +11419,8 @@
                     <m:sSub>
                       <m:sSubPr>
                         <m:ctrlPr>
-                          <a:rPr lang="en-US" sz="2200">
-                            <a:latin typeface="Cambria" panose="02040503050406030204" pitchFamily="18" charset="0"/>
+                          <a:rPr lang="en-US" sz="2200" i="1">
+                            <a:latin typeface="Cambria Math" panose="02040503050406030204" pitchFamily="18" charset="0"/>
                             <a:ea typeface="Cambria" panose="02040503050406030204" pitchFamily="18" charset="0"/>
                           </a:rPr>
                         </m:ctrlPr>
@@ -11087,7 +11428,7 @@
                       <m:e>
                         <m:r>
                           <a:rPr lang="ru-RU" sz="2200">
-                            <a:latin typeface="Cambria" panose="02040503050406030204" pitchFamily="18" charset="0"/>
+                            <a:latin typeface="Cambria Math" panose="02040503050406030204" pitchFamily="18" charset="0"/>
                             <a:ea typeface="Cambria" panose="02040503050406030204" pitchFamily="18" charset="0"/>
                           </a:rPr>
                           <m:t>𝑥</m:t>
@@ -11096,14 +11437,14 @@
                       <m:sub>
                         <m:r>
                           <a:rPr lang="ru-RU" sz="2200">
-                            <a:latin typeface="Cambria" panose="02040503050406030204" pitchFamily="18" charset="0"/>
+                            <a:latin typeface="Cambria Math" panose="02040503050406030204" pitchFamily="18" charset="0"/>
                             <a:ea typeface="Cambria" panose="02040503050406030204" pitchFamily="18" charset="0"/>
                           </a:rPr>
                           <m:t>𝑛</m:t>
                         </m:r>
                         <m:r>
                           <a:rPr lang="ru-RU" sz="2200">
-                            <a:latin typeface="Cambria" panose="02040503050406030204" pitchFamily="18" charset="0"/>
+                            <a:latin typeface="Cambria Math" panose="02040503050406030204" pitchFamily="18" charset="0"/>
                             <a:ea typeface="Cambria" panose="02040503050406030204" pitchFamily="18" charset="0"/>
                           </a:rPr>
                           <m:t>−1</m:t>
@@ -11112,7 +11453,7 @@
                     </m:sSub>
                     <m:r>
                       <a:rPr lang="ru-RU" sz="2200">
-                        <a:latin typeface="Cambria" panose="02040503050406030204" pitchFamily="18" charset="0"/>
+                        <a:latin typeface="Cambria Math" panose="02040503050406030204" pitchFamily="18" charset="0"/>
                         <a:ea typeface="Cambria" panose="02040503050406030204" pitchFamily="18" charset="0"/>
                       </a:rPr>
                       <m:t>,</m:t>
@@ -11120,8 +11461,8 @@
                     <m:sSub>
                       <m:sSubPr>
                         <m:ctrlPr>
-                          <a:rPr lang="en-US" sz="2200">
-                            <a:latin typeface="Cambria" panose="02040503050406030204" pitchFamily="18" charset="0"/>
+                          <a:rPr lang="en-US" sz="2200" i="1">
+                            <a:latin typeface="Cambria Math" panose="02040503050406030204" pitchFamily="18" charset="0"/>
                             <a:ea typeface="Cambria" panose="02040503050406030204" pitchFamily="18" charset="0"/>
                           </a:rPr>
                         </m:ctrlPr>
@@ -11129,7 +11470,7 @@
                       <m:e>
                         <m:r>
                           <a:rPr lang="ru-RU" sz="2200">
-                            <a:latin typeface="Cambria" panose="02040503050406030204" pitchFamily="18" charset="0"/>
+                            <a:latin typeface="Cambria Math" panose="02040503050406030204" pitchFamily="18" charset="0"/>
                             <a:ea typeface="Cambria" panose="02040503050406030204" pitchFamily="18" charset="0"/>
                           </a:rPr>
                           <m:t>𝑢</m:t>
@@ -11138,7 +11479,7 @@
                       <m:sub>
                         <m:r>
                           <a:rPr lang="ru-RU" sz="2200">
-                            <a:latin typeface="Cambria" panose="02040503050406030204" pitchFamily="18" charset="0"/>
+                            <a:latin typeface="Cambria Math" panose="02040503050406030204" pitchFamily="18" charset="0"/>
                             <a:ea typeface="Cambria" panose="02040503050406030204" pitchFamily="18" charset="0"/>
                           </a:rPr>
                           <m:t>𝑛</m:t>
@@ -11147,7 +11488,7 @@
                     </m:sSub>
                     <m:r>
                       <a:rPr lang="ru-RU" sz="2200">
-                        <a:latin typeface="Cambria" panose="02040503050406030204" pitchFamily="18" charset="0"/>
+                        <a:latin typeface="Cambria Math" panose="02040503050406030204" pitchFamily="18" charset="0"/>
                         <a:ea typeface="Cambria" panose="02040503050406030204" pitchFamily="18" charset="0"/>
                       </a:rPr>
                       <m:t>)</m:t>
@@ -11165,7 +11506,7 @@
                   <m:oMath xmlns:m="http://schemas.openxmlformats.org/officeDocument/2006/math">
                     <m:r>
                       <a:rPr lang="ru-RU" sz="2200">
-                        <a:latin typeface="Cambria" panose="02040503050406030204" pitchFamily="18" charset="0"/>
+                        <a:latin typeface="Cambria Math" panose="02040503050406030204" pitchFamily="18" charset="0"/>
                         <a:ea typeface="Cambria" panose="02040503050406030204" pitchFamily="18" charset="0"/>
                       </a:rPr>
                       <m:t>(</m:t>
@@ -11173,8 +11514,8 @@
                     <m:sSub>
                       <m:sSubPr>
                         <m:ctrlPr>
-                          <a:rPr lang="en-US" sz="2200">
-                            <a:latin typeface="Cambria" panose="02040503050406030204" pitchFamily="18" charset="0"/>
+                          <a:rPr lang="en-US" sz="2200" i="1">
+                            <a:latin typeface="Cambria Math" panose="02040503050406030204" pitchFamily="18" charset="0"/>
                             <a:ea typeface="Cambria" panose="02040503050406030204" pitchFamily="18" charset="0"/>
                           </a:rPr>
                         </m:ctrlPr>
@@ -11182,7 +11523,7 @@
                       <m:e>
                         <m:r>
                           <a:rPr lang="ru-RU" sz="2200">
-                            <a:latin typeface="Cambria" panose="02040503050406030204" pitchFamily="18" charset="0"/>
+                            <a:latin typeface="Cambria Math" panose="02040503050406030204" pitchFamily="18" charset="0"/>
                             <a:ea typeface="Cambria" panose="02040503050406030204" pitchFamily="18" charset="0"/>
                           </a:rPr>
                           <m:t>𝑢</m:t>
@@ -11191,14 +11532,14 @@
                       <m:sub>
                         <m:r>
                           <a:rPr lang="ru-RU" sz="2200">
-                            <a:latin typeface="Cambria" panose="02040503050406030204" pitchFamily="18" charset="0"/>
+                            <a:latin typeface="Cambria Math" panose="02040503050406030204" pitchFamily="18" charset="0"/>
                             <a:ea typeface="Cambria" panose="02040503050406030204" pitchFamily="18" charset="0"/>
                           </a:rPr>
                           <m:t>𝑖</m:t>
                         </m:r>
                         <m:r>
                           <a:rPr lang="ru-RU" sz="2200">
-                            <a:latin typeface="Cambria" panose="02040503050406030204" pitchFamily="18" charset="0"/>
+                            <a:latin typeface="Cambria Math" panose="02040503050406030204" pitchFamily="18" charset="0"/>
                             <a:ea typeface="Cambria" panose="02040503050406030204" pitchFamily="18" charset="0"/>
                           </a:rPr>
                           <m:t>+1</m:t>
@@ -11207,7 +11548,7 @@
                     </m:sSub>
                     <m:r>
                       <a:rPr lang="ru-RU" sz="2200">
-                        <a:latin typeface="Cambria" panose="02040503050406030204" pitchFamily="18" charset="0"/>
+                        <a:latin typeface="Cambria Math" panose="02040503050406030204" pitchFamily="18" charset="0"/>
                         <a:ea typeface="Cambria" panose="02040503050406030204" pitchFamily="18" charset="0"/>
                       </a:rPr>
                       <m:t>,…,</m:t>
@@ -11215,8 +11556,8 @@
                     <m:sSub>
                       <m:sSubPr>
                         <m:ctrlPr>
-                          <a:rPr lang="en-US" sz="2200">
-                            <a:latin typeface="Cambria" panose="02040503050406030204" pitchFamily="18" charset="0"/>
+                          <a:rPr lang="en-US" sz="2200" i="1">
+                            <a:latin typeface="Cambria Math" panose="02040503050406030204" pitchFamily="18" charset="0"/>
                             <a:ea typeface="Cambria" panose="02040503050406030204" pitchFamily="18" charset="0"/>
                           </a:rPr>
                         </m:ctrlPr>
@@ -11224,7 +11565,7 @@
                       <m:e>
                         <m:r>
                           <a:rPr lang="ru-RU" sz="2200">
-                            <a:latin typeface="Cambria" panose="02040503050406030204" pitchFamily="18" charset="0"/>
+                            <a:latin typeface="Cambria Math" panose="02040503050406030204" pitchFamily="18" charset="0"/>
                             <a:ea typeface="Cambria" panose="02040503050406030204" pitchFamily="18" charset="0"/>
                           </a:rPr>
                           <m:t>𝑢</m:t>
@@ -11233,7 +11574,7 @@
                       <m:sub>
                         <m:r>
                           <a:rPr lang="ru-RU" sz="2200">
-                            <a:latin typeface="Cambria" panose="02040503050406030204" pitchFamily="18" charset="0"/>
+                            <a:latin typeface="Cambria Math" panose="02040503050406030204" pitchFamily="18" charset="0"/>
                             <a:ea typeface="Cambria" panose="02040503050406030204" pitchFamily="18" charset="0"/>
                           </a:rPr>
                           <m:t>𝑛</m:t>
@@ -11242,7 +11583,7 @@
                     </m:sSub>
                     <m:r>
                       <a:rPr lang="ru-RU" sz="2200">
-                        <a:latin typeface="Cambria" panose="02040503050406030204" pitchFamily="18" charset="0"/>
+                        <a:latin typeface="Cambria Math" panose="02040503050406030204" pitchFamily="18" charset="0"/>
                         <a:ea typeface="Cambria" panose="02040503050406030204" pitchFamily="18" charset="0"/>
                       </a:rPr>
                       <m:t>)</m:t>
@@ -11264,7 +11605,7 @@
             </p:txBody>
           </p:sp>
         </mc:Choice>
-        <mc:Fallback>
+        <mc:Fallback xmlns="">
           <p:sp>
             <p:nvSpPr>
               <p:cNvPr id="11" name="TextBox 10">
@@ -11728,8 +12069,8 @@
           </a:p>
         </p:txBody>
       </p:sp>
-      <mc:AlternateContent xmlns:mc="http://schemas.openxmlformats.org/markup-compatibility/2006">
-        <mc:Choice xmlns:a14="http://schemas.microsoft.com/office/drawing/2010/main" Requires="a14">
+      <mc:AlternateContent xmlns:mc="http://schemas.openxmlformats.org/markup-compatibility/2006" xmlns:a14="http://schemas.microsoft.com/office/drawing/2010/main">
+        <mc:Choice Requires="a14">
           <p:sp>
             <p:nvSpPr>
               <p:cNvPr id="6" name="TextBox 5">
@@ -12278,7 +12619,7 @@
             </p:txBody>
           </p:sp>
         </mc:Choice>
-        <mc:Fallback>
+        <mc:Fallback xmlns="">
           <p:sp>
             <p:nvSpPr>
               <p:cNvPr id="6" name="TextBox 5">
@@ -12440,8 +12781,8 @@
           <a:chExt cx="0" cy="0"/>
         </a:xfrm>
       </p:grpSpPr>
-      <mc:AlternateContent xmlns:mc="http://schemas.openxmlformats.org/markup-compatibility/2006">
-        <mc:Choice xmlns:a14="http://schemas.microsoft.com/office/drawing/2010/main" Requires="a14">
+      <mc:AlternateContent xmlns:mc="http://schemas.openxmlformats.org/markup-compatibility/2006" xmlns:a14="http://schemas.microsoft.com/office/drawing/2010/main">
+        <mc:Choice Requires="a14">
           <p:sp>
             <p:nvSpPr>
               <p:cNvPr id="6" name="TextBox 5">
@@ -12730,7 +13071,7 @@
             </p:txBody>
           </p:sp>
         </mc:Choice>
-        <mc:Fallback>
+        <mc:Fallback xmlns="">
           <p:sp>
             <p:nvSpPr>
               <p:cNvPr id="6" name="TextBox 5">
@@ -12817,8 +13158,8 @@
           </a:p>
         </p:txBody>
       </p:sp>
-      <mc:AlternateContent xmlns:mc="http://schemas.openxmlformats.org/markup-compatibility/2006">
-        <mc:Choice xmlns:a14="http://schemas.microsoft.com/office/drawing/2010/main" Requires="a14">
+      <mc:AlternateContent xmlns:mc="http://schemas.openxmlformats.org/markup-compatibility/2006" xmlns:a14="http://schemas.microsoft.com/office/drawing/2010/main">
+        <mc:Choice Requires="a14">
           <p:sp>
             <p:nvSpPr>
               <p:cNvPr id="8" name="TextBox 7">
@@ -13214,7 +13555,7 @@
             </p:txBody>
           </p:sp>
         </mc:Choice>
-        <mc:Fallback>
+        <mc:Fallback xmlns="">
           <p:sp>
             <p:nvSpPr>
               <p:cNvPr id="8" name="TextBox 7">

</xml_diff>